<commit_message>
Harmonic model is created, we can argue that controlability range with respect to duty cycle and operation frequency.
</commit_message>
<xml_diff>
--- a/Presentation/2020.02.08.pptx
+++ b/Presentation/2020.02.08.pptx
@@ -13,7 +13,10 @@
     <p:sldId id="261" r:id="rId7"/>
     <p:sldId id="262" r:id="rId8"/>
     <p:sldId id="263" r:id="rId9"/>
-    <p:sldId id="264" r:id="rId10"/>
+    <p:sldId id="265" r:id="rId10"/>
+    <p:sldId id="266" r:id="rId11"/>
+    <p:sldId id="267" r:id="rId12"/>
+    <p:sldId id="264" r:id="rId13"/>
   </p:sldIdLst>
   <p:sldSz cx="12192000" cy="6858000"/>
   <p:notesSz cx="6858000" cy="9144000"/>
@@ -4530,6 +4533,216 @@
 </p:sld>
 </file>
 
+<file path=ppt/slides/slide10.xml><?xml version="1.0" encoding="utf-8"?>
+<p:sld xmlns:a="http://schemas.openxmlformats.org/drawingml/2006/main" xmlns:r="http://schemas.openxmlformats.org/officeDocument/2006/relationships" xmlns:p="http://schemas.openxmlformats.org/presentationml/2006/main">
+  <p:cSld>
+    <p:spTree>
+      <p:nvGrpSpPr>
+        <p:cNvPr id="1" name=""/>
+        <p:cNvGrpSpPr/>
+        <p:nvPr/>
+      </p:nvGrpSpPr>
+      <p:grpSpPr>
+        <a:xfrm>
+          <a:off x="0" y="0"/>
+          <a:ext cx="0" cy="0"/>
+          <a:chOff x="0" y="0"/>
+          <a:chExt cx="0" cy="0"/>
+        </a:xfrm>
+      </p:grpSpPr>
+      <p:pic>
+        <p:nvPicPr>
+          <p:cNvPr id="16" name="Picture 15">
+            <a:extLst>
+              <a:ext uri="{FF2B5EF4-FFF2-40B4-BE49-F238E27FC236}">
+                <a16:creationId xmlns:a16="http://schemas.microsoft.com/office/drawing/2014/main" id="{07FE2F52-0176-4131-B58E-128A319307C8}"/>
+              </a:ext>
+            </a:extLst>
+          </p:cNvPr>
+          <p:cNvPicPr>
+            <a:picLocks noChangeAspect="1"/>
+          </p:cNvPicPr>
+          <p:nvPr/>
+        </p:nvPicPr>
+        <p:blipFill>
+          <a:blip r:embed="rId2"/>
+          <a:stretch>
+            <a:fillRect/>
+          </a:stretch>
+        </p:blipFill>
+        <p:spPr>
+          <a:xfrm>
+            <a:off x="1996751" y="354563"/>
+            <a:ext cx="8198497" cy="6148873"/>
+          </a:xfrm>
+          <a:prstGeom prst="rect">
+            <a:avLst/>
+          </a:prstGeom>
+        </p:spPr>
+      </p:pic>
+    </p:spTree>
+    <p:extLst>
+      <p:ext uri="{BB962C8B-B14F-4D97-AF65-F5344CB8AC3E}">
+        <p14:creationId xmlns:p14="http://schemas.microsoft.com/office/powerpoint/2010/main" val="3300276160"/>
+      </p:ext>
+    </p:extLst>
+  </p:cSld>
+  <p:clrMapOvr>
+    <a:masterClrMapping/>
+  </p:clrMapOvr>
+</p:sld>
+</file>
+
+<file path=ppt/slides/slide11.xml><?xml version="1.0" encoding="utf-8"?>
+<p:sld xmlns:a="http://schemas.openxmlformats.org/drawingml/2006/main" xmlns:r="http://schemas.openxmlformats.org/officeDocument/2006/relationships" xmlns:p="http://schemas.openxmlformats.org/presentationml/2006/main">
+  <p:cSld>
+    <p:spTree>
+      <p:nvGrpSpPr>
+        <p:cNvPr id="1" name=""/>
+        <p:cNvGrpSpPr/>
+        <p:nvPr/>
+      </p:nvGrpSpPr>
+      <p:grpSpPr>
+        <a:xfrm>
+          <a:off x="0" y="0"/>
+          <a:ext cx="0" cy="0"/>
+          <a:chOff x="0" y="0"/>
+          <a:chExt cx="0" cy="0"/>
+        </a:xfrm>
+      </p:grpSpPr>
+      <p:pic>
+        <p:nvPicPr>
+          <p:cNvPr id="9" name="Picture 8">
+            <a:extLst>
+              <a:ext uri="{FF2B5EF4-FFF2-40B4-BE49-F238E27FC236}">
+                <a16:creationId xmlns:a16="http://schemas.microsoft.com/office/drawing/2014/main" id="{F02429B1-4313-43BB-843C-C1C6275541DE}"/>
+              </a:ext>
+            </a:extLst>
+          </p:cNvPr>
+          <p:cNvPicPr>
+            <a:picLocks noChangeAspect="1"/>
+          </p:cNvPicPr>
+          <p:nvPr/>
+        </p:nvPicPr>
+        <p:blipFill>
+          <a:blip r:embed="rId2"/>
+          <a:stretch>
+            <a:fillRect/>
+          </a:stretch>
+        </p:blipFill>
+        <p:spPr>
+          <a:xfrm>
+            <a:off x="1726163" y="342900"/>
+            <a:ext cx="8229600" cy="6172200"/>
+          </a:xfrm>
+          <a:prstGeom prst="rect">
+            <a:avLst/>
+          </a:prstGeom>
+        </p:spPr>
+      </p:pic>
+    </p:spTree>
+    <p:extLst>
+      <p:ext uri="{BB962C8B-B14F-4D97-AF65-F5344CB8AC3E}">
+        <p14:creationId xmlns:p14="http://schemas.microsoft.com/office/powerpoint/2010/main" val="238414822"/>
+      </p:ext>
+    </p:extLst>
+  </p:cSld>
+  <p:clrMapOvr>
+    <a:masterClrMapping/>
+  </p:clrMapOvr>
+</p:sld>
+</file>
+
+<file path=ppt/slides/slide12.xml><?xml version="1.0" encoding="utf-8"?>
+<p:sld xmlns:a="http://schemas.openxmlformats.org/drawingml/2006/main" xmlns:r="http://schemas.openxmlformats.org/officeDocument/2006/relationships" xmlns:p="http://schemas.openxmlformats.org/presentationml/2006/main">
+  <p:cSld>
+    <p:spTree>
+      <p:nvGrpSpPr>
+        <p:cNvPr id="1" name=""/>
+        <p:cNvGrpSpPr/>
+        <p:nvPr/>
+      </p:nvGrpSpPr>
+      <p:grpSpPr>
+        <a:xfrm>
+          <a:off x="0" y="0"/>
+          <a:ext cx="0" cy="0"/>
+          <a:chOff x="0" y="0"/>
+          <a:chExt cx="0" cy="0"/>
+        </a:xfrm>
+      </p:grpSpPr>
+      <p:pic>
+        <p:nvPicPr>
+          <p:cNvPr id="6" name="Picture 5">
+            <a:extLst>
+              <a:ext uri="{FF2B5EF4-FFF2-40B4-BE49-F238E27FC236}">
+                <a16:creationId xmlns:a16="http://schemas.microsoft.com/office/drawing/2014/main" id="{3CD662F6-5D71-495F-8547-58AAA9B15A99}"/>
+              </a:ext>
+            </a:extLst>
+          </p:cNvPr>
+          <p:cNvPicPr>
+            <a:picLocks noChangeAspect="1"/>
+          </p:cNvPicPr>
+          <p:nvPr/>
+        </p:nvPicPr>
+        <p:blipFill>
+          <a:blip r:embed="rId2"/>
+          <a:stretch>
+            <a:fillRect/>
+          </a:stretch>
+        </p:blipFill>
+        <p:spPr>
+          <a:xfrm>
+            <a:off x="1073410" y="811764"/>
+            <a:ext cx="4857748" cy="3643311"/>
+          </a:xfrm>
+          <a:prstGeom prst="rect">
+            <a:avLst/>
+          </a:prstGeom>
+        </p:spPr>
+      </p:pic>
+      <p:pic>
+        <p:nvPicPr>
+          <p:cNvPr id="7" name="Picture 6">
+            <a:extLst>
+              <a:ext uri="{FF2B5EF4-FFF2-40B4-BE49-F238E27FC236}">
+                <a16:creationId xmlns:a16="http://schemas.microsoft.com/office/drawing/2014/main" id="{49EBB398-1461-444E-B1E7-A283DABD5E4A}"/>
+              </a:ext>
+            </a:extLst>
+          </p:cNvPr>
+          <p:cNvPicPr>
+            <a:picLocks noChangeAspect="1"/>
+          </p:cNvPicPr>
+          <p:nvPr/>
+        </p:nvPicPr>
+        <p:blipFill>
+          <a:blip r:embed="rId3"/>
+          <a:stretch>
+            <a:fillRect/>
+          </a:stretch>
+        </p:blipFill>
+        <p:spPr>
+          <a:xfrm>
+            <a:off x="6596742" y="1079872"/>
+            <a:ext cx="4521848" cy="3391386"/>
+          </a:xfrm>
+          <a:prstGeom prst="rect">
+            <a:avLst/>
+          </a:prstGeom>
+        </p:spPr>
+      </p:pic>
+    </p:spTree>
+    <p:extLst>
+      <p:ext uri="{BB962C8B-B14F-4D97-AF65-F5344CB8AC3E}">
+        <p14:creationId xmlns:p14="http://schemas.microsoft.com/office/powerpoint/2010/main" val="4149291038"/>
+      </p:ext>
+    </p:extLst>
+  </p:cSld>
+  <p:clrMapOvr>
+    <a:masterClrMapping/>
+  </p:clrMapOvr>
+</p:sld>
+</file>
+
 <file path=ppt/slides/slide2.xml><?xml version="1.0" encoding="utf-8"?>
 <p:sld xmlns:a="http://schemas.openxmlformats.org/drawingml/2006/main" xmlns:r="http://schemas.openxmlformats.org/officeDocument/2006/relationships" xmlns:p="http://schemas.openxmlformats.org/presentationml/2006/main">
   <p:cSld>
@@ -5565,7 +5778,7 @@
         <p:spPr>
           <a:xfrm flipH="1" flipV="1">
             <a:off x="6270171" y="1791077"/>
-            <a:ext cx="372696" cy="3930343"/>
+            <a:ext cx="538843" cy="3742987"/>
           </a:xfrm>
           <a:prstGeom prst="straightConnector1">
             <a:avLst/>
@@ -5603,8 +5816,8 @@
         </p:nvSpPr>
         <p:spPr>
           <a:xfrm>
-            <a:off x="5734906" y="5721420"/>
-            <a:ext cx="1815921" cy="1200329"/>
+            <a:off x="5267130" y="5534064"/>
+            <a:ext cx="3083767" cy="1200329"/>
           </a:xfrm>
           <a:prstGeom prst="rect">
             <a:avLst/>
@@ -5617,6 +5830,10 @@
           </a:bodyPr>
           <a:lstStyle/>
           <a:p>
+            <a:pPr marL="285750" indent="-285750">
+              <a:buFont typeface="Arial" panose="020B0604020202020204" pitchFamily="34" charset="0"/>
+              <a:buChar char="•"/>
+            </a:pPr>
             <a:r>
               <a:rPr lang="en-US" dirty="0"/>
               <a:t>Bu </a:t>
@@ -5658,6 +5875,102 @@
                 <a:sym typeface="Wingdings" panose="05000000000000000000" pitchFamily="2" charset="2"/>
               </a:rPr>
               <a:t></a:t>
+            </a:r>
+          </a:p>
+          <a:p>
+            <a:pPr marL="285750" indent="-285750">
+              <a:buFont typeface="Arial" panose="020B0604020202020204" pitchFamily="34" charset="0"/>
+              <a:buChar char="•"/>
+            </a:pPr>
+            <a:r>
+              <a:rPr lang="en-US" dirty="0">
+                <a:sym typeface="Wingdings" panose="05000000000000000000" pitchFamily="2" charset="2"/>
+              </a:rPr>
+              <a:t>Bir </a:t>
+            </a:r>
+            <a:r>
+              <a:rPr lang="en-US" dirty="0" err="1">
+                <a:sym typeface="Wingdings" panose="05000000000000000000" pitchFamily="2" charset="2"/>
+              </a:rPr>
+              <a:t>şey</a:t>
+            </a:r>
+            <a:r>
+              <a:rPr lang="en-US" dirty="0">
+                <a:sym typeface="Wingdings" panose="05000000000000000000" pitchFamily="2" charset="2"/>
+              </a:rPr>
+              <a:t> </a:t>
+            </a:r>
+            <a:r>
+              <a:rPr lang="en-US" dirty="0" err="1">
+                <a:sym typeface="Wingdings" panose="05000000000000000000" pitchFamily="2" charset="2"/>
+              </a:rPr>
+              <a:t>olmadı</a:t>
+            </a:r>
+            <a:r>
+              <a:rPr lang="en-US" dirty="0">
+                <a:sym typeface="Wingdings" panose="05000000000000000000" pitchFamily="2" charset="2"/>
+              </a:rPr>
+              <a:t> </a:t>
+            </a:r>
+            <a:r>
+              <a:rPr lang="en-US" dirty="0" err="1">
+                <a:sym typeface="Wingdings" panose="05000000000000000000" pitchFamily="2" charset="2"/>
+              </a:rPr>
+              <a:t>bu</a:t>
+            </a:r>
+            <a:r>
+              <a:rPr lang="en-US" dirty="0">
+                <a:sym typeface="Wingdings" panose="05000000000000000000" pitchFamily="2" charset="2"/>
+              </a:rPr>
+              <a:t> </a:t>
+            </a:r>
+            <a:r>
+              <a:rPr lang="en-US" dirty="0" err="1">
+                <a:sym typeface="Wingdings" panose="05000000000000000000" pitchFamily="2" charset="2"/>
+              </a:rPr>
+              <a:t>frekansta</a:t>
+            </a:r>
+            <a:r>
+              <a:rPr lang="en-US" dirty="0">
+                <a:sym typeface="Wingdings" panose="05000000000000000000" pitchFamily="2" charset="2"/>
+              </a:rPr>
+              <a:t> </a:t>
+            </a:r>
+            <a:r>
+              <a:rPr lang="en-US" dirty="0" err="1">
+                <a:sym typeface="Wingdings" panose="05000000000000000000" pitchFamily="2" charset="2"/>
+              </a:rPr>
+              <a:t>aklım</a:t>
+            </a:r>
+            <a:r>
+              <a:rPr lang="en-US" dirty="0">
+                <a:sym typeface="Wingdings" panose="05000000000000000000" pitchFamily="2" charset="2"/>
+              </a:rPr>
+              <a:t> </a:t>
+            </a:r>
+            <a:r>
+              <a:rPr lang="en-US" dirty="0" err="1">
+                <a:sym typeface="Wingdings" panose="05000000000000000000" pitchFamily="2" charset="2"/>
+              </a:rPr>
+              <a:t>çok</a:t>
+            </a:r>
+            <a:r>
+              <a:rPr lang="en-US" dirty="0">
+                <a:sym typeface="Wingdings" panose="05000000000000000000" pitchFamily="2" charset="2"/>
+              </a:rPr>
+              <a:t> </a:t>
+            </a:r>
+            <a:r>
+              <a:rPr lang="en-US" dirty="0" err="1">
+                <a:sym typeface="Wingdings" panose="05000000000000000000" pitchFamily="2" charset="2"/>
+              </a:rPr>
+              <a:t>karışık</a:t>
+            </a:r>
+            <a:r>
+              <a:rPr lang="en-US" dirty="0">
+                <a:sym typeface="Wingdings" panose="05000000000000000000" pitchFamily="2" charset="2"/>
+              </a:rPr>
+              <a:t> </a:t>
             </a:r>
             <a:endParaRPr lang="en-US" dirty="0"/>
           </a:p>
@@ -7385,12 +7698,392 @@
           <a:chExt cx="0" cy="0"/>
         </a:xfrm>
       </p:grpSpPr>
-      <p:sp>
-        <p:nvSpPr>
-          <p:cNvPr id="2" name="Title 1">
-            <a:extLst>
-              <a:ext uri="{FF2B5EF4-FFF2-40B4-BE49-F238E27FC236}">
-                <a16:creationId xmlns:a16="http://schemas.microsoft.com/office/drawing/2014/main" id="{2FA6F5EC-F4EC-4B69-B9A3-7B7FDC14D7A8}"/>
+      <p:pic>
+        <p:nvPicPr>
+          <p:cNvPr id="4" name="Picture 3">
+            <a:extLst>
+              <a:ext uri="{FF2B5EF4-FFF2-40B4-BE49-F238E27FC236}">
+                <a16:creationId xmlns:a16="http://schemas.microsoft.com/office/drawing/2014/main" id="{DC27C569-B002-4331-8529-233790734412}"/>
+              </a:ext>
+            </a:extLst>
+          </p:cNvPr>
+          <p:cNvPicPr>
+            <a:picLocks noChangeAspect="1"/>
+          </p:cNvPicPr>
+          <p:nvPr/>
+        </p:nvPicPr>
+        <p:blipFill>
+          <a:blip r:embed="rId2"/>
+          <a:stretch>
+            <a:fillRect/>
+          </a:stretch>
+        </p:blipFill>
+        <p:spPr>
+          <a:xfrm>
+            <a:off x="164138" y="620488"/>
+            <a:ext cx="5931862" cy="4020716"/>
+          </a:xfrm>
+          <a:prstGeom prst="rect">
+            <a:avLst/>
+          </a:prstGeom>
+        </p:spPr>
+      </p:pic>
+      <p:sp>
+        <p:nvSpPr>
+          <p:cNvPr id="5" name="TextBox 4">
+            <a:extLst>
+              <a:ext uri="{FF2B5EF4-FFF2-40B4-BE49-F238E27FC236}">
+                <a16:creationId xmlns:a16="http://schemas.microsoft.com/office/drawing/2014/main" id="{95F32377-45EB-4FEA-8B96-38070934B223}"/>
+              </a:ext>
+            </a:extLst>
+          </p:cNvPr>
+          <p:cNvSpPr txBox="1"/>
+          <p:nvPr/>
+        </p:nvSpPr>
+        <p:spPr>
+          <a:xfrm>
+            <a:off x="8071682" y="4550813"/>
+            <a:ext cx="3956180" cy="369332"/>
+          </a:xfrm>
+          <a:prstGeom prst="rect">
+            <a:avLst/>
+          </a:prstGeom>
+          <a:noFill/>
+        </p:spPr>
+        <p:txBody>
+          <a:bodyPr wrap="square" rtlCol="0">
+            <a:spAutoFit/>
+          </a:bodyPr>
+          <a:lstStyle/>
+          <a:p>
+            <a:r>
+              <a:rPr lang="en-US" dirty="0"/>
+              <a:t>Constant Frequency</a:t>
+            </a:r>
+          </a:p>
+        </p:txBody>
+      </p:sp>
+      <p:pic>
+        <p:nvPicPr>
+          <p:cNvPr id="6" name="Picture 5">
+            <a:extLst>
+              <a:ext uri="{FF2B5EF4-FFF2-40B4-BE49-F238E27FC236}">
+                <a16:creationId xmlns:a16="http://schemas.microsoft.com/office/drawing/2014/main" id="{967ABE4B-875F-4985-AB45-46CCAE25E98A}"/>
+              </a:ext>
+            </a:extLst>
+          </p:cNvPr>
+          <p:cNvPicPr>
+            <a:picLocks noChangeAspect="1"/>
+          </p:cNvPicPr>
+          <p:nvPr/>
+        </p:nvPicPr>
+        <p:blipFill>
+          <a:blip r:embed="rId3"/>
+          <a:stretch>
+            <a:fillRect/>
+          </a:stretch>
+        </p:blipFill>
+        <p:spPr>
+          <a:xfrm>
+            <a:off x="6451266" y="604739"/>
+            <a:ext cx="5334000" cy="4000500"/>
+          </a:xfrm>
+          <a:prstGeom prst="rect">
+            <a:avLst/>
+          </a:prstGeom>
+        </p:spPr>
+      </p:pic>
+      <p:sp>
+        <p:nvSpPr>
+          <p:cNvPr id="7" name="TextBox 6">
+            <a:extLst>
+              <a:ext uri="{FF2B5EF4-FFF2-40B4-BE49-F238E27FC236}">
+                <a16:creationId xmlns:a16="http://schemas.microsoft.com/office/drawing/2014/main" id="{8A0CC347-7E74-4E39-AB75-E55407161684}"/>
+              </a:ext>
+            </a:extLst>
+          </p:cNvPr>
+          <p:cNvSpPr txBox="1"/>
+          <p:nvPr/>
+        </p:nvSpPr>
+        <p:spPr>
+          <a:xfrm>
+            <a:off x="2233127" y="4587847"/>
+            <a:ext cx="3956180" cy="369332"/>
+          </a:xfrm>
+          <a:prstGeom prst="rect">
+            <a:avLst/>
+          </a:prstGeom>
+          <a:noFill/>
+        </p:spPr>
+        <p:txBody>
+          <a:bodyPr wrap="square" rtlCol="0">
+            <a:spAutoFit/>
+          </a:bodyPr>
+          <a:lstStyle/>
+          <a:p>
+            <a:r>
+              <a:rPr lang="en-US" dirty="0"/>
+              <a:t>Constant Duty Cycle</a:t>
+            </a:r>
+          </a:p>
+        </p:txBody>
+      </p:sp>
+      <p:sp>
+        <p:nvSpPr>
+          <p:cNvPr id="8" name="TextBox 7">
+            <a:extLst>
+              <a:ext uri="{FF2B5EF4-FFF2-40B4-BE49-F238E27FC236}">
+                <a16:creationId xmlns:a16="http://schemas.microsoft.com/office/drawing/2014/main" id="{9A88EBBC-317F-472A-BE4F-FF362FB2C738}"/>
+              </a:ext>
+            </a:extLst>
+          </p:cNvPr>
+          <p:cNvSpPr txBox="1"/>
+          <p:nvPr/>
+        </p:nvSpPr>
+        <p:spPr>
+          <a:xfrm>
+            <a:off x="681135" y="4991878"/>
+            <a:ext cx="5122506" cy="646331"/>
+          </a:xfrm>
+          <a:prstGeom prst="rect">
+            <a:avLst/>
+          </a:prstGeom>
+          <a:noFill/>
+        </p:spPr>
+        <p:txBody>
+          <a:bodyPr wrap="square" rtlCol="0">
+            <a:spAutoFit/>
+          </a:bodyPr>
+          <a:lstStyle/>
+          <a:p>
+            <a:r>
+              <a:rPr lang="en-US" dirty="0"/>
+              <a:t>Minimum frequency 80 </a:t>
+            </a:r>
+            <a:r>
+              <a:rPr lang="en-US" dirty="0" err="1"/>
+              <a:t>khZ</a:t>
+            </a:r>
+            <a:r>
+              <a:rPr lang="en-US" dirty="0"/>
+              <a:t> : Gain 0.52</a:t>
+            </a:r>
+          </a:p>
+          <a:p>
+            <a:r>
+              <a:rPr lang="en-US" dirty="0"/>
+              <a:t>Maximum frequency 110kHz: Gain 0.16</a:t>
+            </a:r>
+          </a:p>
+        </p:txBody>
+      </p:sp>
+      <p:sp>
+        <p:nvSpPr>
+          <p:cNvPr id="9" name="TextBox 8">
+            <a:extLst>
+              <a:ext uri="{FF2B5EF4-FFF2-40B4-BE49-F238E27FC236}">
+                <a16:creationId xmlns:a16="http://schemas.microsoft.com/office/drawing/2014/main" id="{43C3C131-D2D7-424A-B4B3-8AABA586A64E}"/>
+              </a:ext>
+            </a:extLst>
+          </p:cNvPr>
+          <p:cNvSpPr txBox="1"/>
+          <p:nvPr/>
+        </p:nvSpPr>
+        <p:spPr>
+          <a:xfrm>
+            <a:off x="6905356" y="4991877"/>
+            <a:ext cx="5122506" cy="646331"/>
+          </a:xfrm>
+          <a:prstGeom prst="rect">
+            <a:avLst/>
+          </a:prstGeom>
+          <a:noFill/>
+        </p:spPr>
+        <p:txBody>
+          <a:bodyPr wrap="square" rtlCol="0">
+            <a:spAutoFit/>
+          </a:bodyPr>
+          <a:lstStyle/>
+          <a:p>
+            <a:r>
+              <a:rPr lang="en-US" dirty="0"/>
+              <a:t>Minimum duty  0.5: Gain 1.27</a:t>
+            </a:r>
+          </a:p>
+          <a:p>
+            <a:r>
+              <a:rPr lang="en-US" dirty="0"/>
+              <a:t>Maximum duty 0.9: Gain 0.3935</a:t>
+            </a:r>
+          </a:p>
+        </p:txBody>
+      </p:sp>
+      <p:cxnSp>
+        <p:nvCxnSpPr>
+          <p:cNvPr id="11" name="Straight Connector 10">
+            <a:extLst>
+              <a:ext uri="{FF2B5EF4-FFF2-40B4-BE49-F238E27FC236}">
+                <a16:creationId xmlns:a16="http://schemas.microsoft.com/office/drawing/2014/main" id="{19B02DE6-B856-4017-992C-7194955294CB}"/>
+              </a:ext>
+            </a:extLst>
+          </p:cNvPr>
+          <p:cNvCxnSpPr>
+            <a:cxnSpLocks/>
+          </p:cNvCxnSpPr>
+          <p:nvPr/>
+        </p:nvCxnSpPr>
+        <p:spPr>
+          <a:xfrm>
+            <a:off x="4655976" y="5150498"/>
+            <a:ext cx="2249380" cy="317241"/>
+          </a:xfrm>
+          <a:prstGeom prst="line">
+            <a:avLst/>
+          </a:prstGeom>
+        </p:spPr>
+        <p:style>
+          <a:lnRef idx="1">
+            <a:schemeClr val="accent1"/>
+          </a:lnRef>
+          <a:fillRef idx="0">
+            <a:schemeClr val="accent1"/>
+          </a:fillRef>
+          <a:effectRef idx="0">
+            <a:schemeClr val="accent1"/>
+          </a:effectRef>
+          <a:fontRef idx="minor">
+            <a:schemeClr val="tx1"/>
+          </a:fontRef>
+        </p:style>
+      </p:cxnSp>
+      <p:cxnSp>
+        <p:nvCxnSpPr>
+          <p:cNvPr id="13" name="Straight Connector 12">
+            <a:extLst>
+              <a:ext uri="{FF2B5EF4-FFF2-40B4-BE49-F238E27FC236}">
+                <a16:creationId xmlns:a16="http://schemas.microsoft.com/office/drawing/2014/main" id="{49E43A3C-39CE-4813-984E-DA88A7445A71}"/>
+              </a:ext>
+            </a:extLst>
+          </p:cNvPr>
+          <p:cNvCxnSpPr>
+            <a:cxnSpLocks/>
+          </p:cNvCxnSpPr>
+          <p:nvPr/>
+        </p:nvCxnSpPr>
+        <p:spPr>
+          <a:xfrm flipH="1">
+            <a:off x="4655976" y="5150498"/>
+            <a:ext cx="2037886" cy="317241"/>
+          </a:xfrm>
+          <a:prstGeom prst="line">
+            <a:avLst/>
+          </a:prstGeom>
+        </p:spPr>
+        <p:style>
+          <a:lnRef idx="1">
+            <a:schemeClr val="accent1"/>
+          </a:lnRef>
+          <a:fillRef idx="0">
+            <a:schemeClr val="accent1"/>
+          </a:fillRef>
+          <a:effectRef idx="0">
+            <a:schemeClr val="accent1"/>
+          </a:effectRef>
+          <a:fontRef idx="minor">
+            <a:schemeClr val="tx1"/>
+          </a:fontRef>
+        </p:style>
+      </p:cxnSp>
+      <p:sp>
+        <p:nvSpPr>
+          <p:cNvPr id="20" name="TextBox 19">
+            <a:extLst>
+              <a:ext uri="{FF2B5EF4-FFF2-40B4-BE49-F238E27FC236}">
+                <a16:creationId xmlns:a16="http://schemas.microsoft.com/office/drawing/2014/main" id="{F8B2130B-5920-4F4B-950B-73223B70392A}"/>
+              </a:ext>
+            </a:extLst>
+          </p:cNvPr>
+          <p:cNvSpPr txBox="1"/>
+          <p:nvPr/>
+        </p:nvSpPr>
+        <p:spPr>
+          <a:xfrm>
+            <a:off x="4565780" y="5854377"/>
+            <a:ext cx="2964024" cy="369332"/>
+          </a:xfrm>
+          <a:prstGeom prst="rect">
+            <a:avLst/>
+          </a:prstGeom>
+          <a:noFill/>
+        </p:spPr>
+        <p:txBody>
+          <a:bodyPr wrap="square" rtlCol="0">
+            <a:spAutoFit/>
+          </a:bodyPr>
+          <a:lstStyle/>
+          <a:p>
+            <a:r>
+              <a:rPr lang="en-US" dirty="0"/>
+              <a:t>DC gain </a:t>
+            </a:r>
+            <a:r>
+              <a:rPr lang="en-US" dirty="0">
+                <a:sym typeface="Wingdings" panose="05000000000000000000" pitchFamily="2" charset="2"/>
+              </a:rPr>
+              <a:t> 0.6 (maximum) </a:t>
+            </a:r>
+            <a:endParaRPr lang="en-US" dirty="0"/>
+          </a:p>
+        </p:txBody>
+      </p:sp>
+      <p:sp>
+        <p:nvSpPr>
+          <p:cNvPr id="21" name="TextBox 20">
+            <a:extLst>
+              <a:ext uri="{FF2B5EF4-FFF2-40B4-BE49-F238E27FC236}">
+                <a16:creationId xmlns:a16="http://schemas.microsoft.com/office/drawing/2014/main" id="{9B8583C4-A19B-4F46-91E5-52CC3105B1F3}"/>
+              </a:ext>
+            </a:extLst>
+          </p:cNvPr>
+          <p:cNvSpPr txBox="1"/>
+          <p:nvPr/>
+        </p:nvSpPr>
+        <p:spPr>
+          <a:xfrm>
+            <a:off x="4565780" y="6170444"/>
+            <a:ext cx="2833397" cy="369332"/>
+          </a:xfrm>
+          <a:prstGeom prst="rect">
+            <a:avLst/>
+          </a:prstGeom>
+          <a:noFill/>
+        </p:spPr>
+        <p:txBody>
+          <a:bodyPr wrap="square" rtlCol="0">
+            <a:spAutoFit/>
+          </a:bodyPr>
+          <a:lstStyle/>
+          <a:p>
+            <a:r>
+              <a:rPr lang="en-US" dirty="0"/>
+              <a:t>AC gain </a:t>
+            </a:r>
+            <a:r>
+              <a:rPr lang="en-US" dirty="0">
+                <a:sym typeface="Wingdings" panose="05000000000000000000" pitchFamily="2" charset="2"/>
+              </a:rPr>
+              <a:t> 0.20  (constant)</a:t>
+            </a:r>
+            <a:endParaRPr lang="en-US" dirty="0"/>
+          </a:p>
+        </p:txBody>
+      </p:sp>
+      <p:sp>
+        <p:nvSpPr>
+          <p:cNvPr id="22" name="Title 1">
+            <a:extLst>
+              <a:ext uri="{FF2B5EF4-FFF2-40B4-BE49-F238E27FC236}">
+                <a16:creationId xmlns:a16="http://schemas.microsoft.com/office/drawing/2014/main" id="{04E5064E-DEB4-4D58-88CC-B0EA6E749DB6}"/>
               </a:ext>
             </a:extLst>
           </p:cNvPr>
@@ -7401,44 +8094,27 @@
             <p:ph type="title"/>
           </p:nvPr>
         </p:nvSpPr>
-        <p:spPr/>
+        <p:spPr>
+          <a:xfrm>
+            <a:off x="3380015" y="83641"/>
+            <a:ext cx="5525278" cy="757627"/>
+          </a:xfrm>
+        </p:spPr>
         <p:txBody>
           <a:bodyPr/>
           <a:lstStyle/>
           <a:p>
-            <a:endParaRPr lang="en-US" dirty="0"/>
-          </a:p>
-        </p:txBody>
-      </p:sp>
-      <p:sp>
-        <p:nvSpPr>
-          <p:cNvPr id="3" name="Content Placeholder 2">
-            <a:extLst>
-              <a:ext uri="{FF2B5EF4-FFF2-40B4-BE49-F238E27FC236}">
-                <a16:creationId xmlns:a16="http://schemas.microsoft.com/office/drawing/2014/main" id="{9775FA24-60C6-4772-9068-FBA60BFD27A3}"/>
-              </a:ext>
-            </a:extLst>
-          </p:cNvPr>
-          <p:cNvSpPr>
-            <a:spLocks noGrp="1"/>
-          </p:cNvSpPr>
-          <p:nvPr>
-            <p:ph idx="1"/>
-          </p:nvPr>
-        </p:nvSpPr>
-        <p:spPr/>
-        <p:txBody>
-          <a:bodyPr/>
-          <a:lstStyle/>
-          <a:p>
-            <a:endParaRPr lang="en-US"/>
+            <a:r>
+              <a:rPr lang="en-US" dirty="0"/>
+              <a:t>Duty Cycle-Frequency </a:t>
+            </a:r>
           </a:p>
         </p:txBody>
       </p:sp>
     </p:spTree>
     <p:extLst>
       <p:ext uri="{BB962C8B-B14F-4D97-AF65-F5344CB8AC3E}">
-        <p14:creationId xmlns:p14="http://schemas.microsoft.com/office/powerpoint/2010/main" val="4149291038"/>
+        <p14:creationId xmlns:p14="http://schemas.microsoft.com/office/powerpoint/2010/main" val="2262665028"/>
       </p:ext>
     </p:extLst>
   </p:cSld>

</xml_diff>

<commit_message>
variable frequency and duty simulink model is created, DC Bus analitik model is also created.
</commit_message>
<xml_diff>
--- a/Presentation/2020.02.08.pptx
+++ b/Presentation/2020.02.08.pptx
@@ -17,6 +17,8 @@
     <p:sldId id="266" r:id="rId11"/>
     <p:sldId id="267" r:id="rId12"/>
     <p:sldId id="264" r:id="rId13"/>
+    <p:sldId id="268" r:id="rId14"/>
+    <p:sldId id="269" r:id="rId15"/>
   </p:sldIdLst>
   <p:sldSz cx="12192000" cy="6858000"/>
   <p:notesSz cx="6858000" cy="9144000"/>
@@ -270,7 +272,7 @@
           <a:p>
             <a:fld id="{A0AEBE10-9D9F-4B7B-95CC-EECC3455423B}" type="datetimeFigureOut">
               <a:rPr lang="en-US" smtClean="0"/>
-              <a:t>2/7/2021</a:t>
+              <a:t>2/9/2021</a:t>
             </a:fld>
             <a:endParaRPr lang="en-US"/>
           </a:p>
@@ -468,7 +470,7 @@
           <a:p>
             <a:fld id="{A0AEBE10-9D9F-4B7B-95CC-EECC3455423B}" type="datetimeFigureOut">
               <a:rPr lang="en-US" smtClean="0"/>
-              <a:t>2/7/2021</a:t>
+              <a:t>2/9/2021</a:t>
             </a:fld>
             <a:endParaRPr lang="en-US"/>
           </a:p>
@@ -676,7 +678,7 @@
           <a:p>
             <a:fld id="{A0AEBE10-9D9F-4B7B-95CC-EECC3455423B}" type="datetimeFigureOut">
               <a:rPr lang="en-US" smtClean="0"/>
-              <a:t>2/7/2021</a:t>
+              <a:t>2/9/2021</a:t>
             </a:fld>
             <a:endParaRPr lang="en-US"/>
           </a:p>
@@ -874,7 +876,7 @@
           <a:p>
             <a:fld id="{A0AEBE10-9D9F-4B7B-95CC-EECC3455423B}" type="datetimeFigureOut">
               <a:rPr lang="en-US" smtClean="0"/>
-              <a:t>2/7/2021</a:t>
+              <a:t>2/9/2021</a:t>
             </a:fld>
             <a:endParaRPr lang="en-US"/>
           </a:p>
@@ -1149,7 +1151,7 @@
           <a:p>
             <a:fld id="{A0AEBE10-9D9F-4B7B-95CC-EECC3455423B}" type="datetimeFigureOut">
               <a:rPr lang="en-US" smtClean="0"/>
-              <a:t>2/7/2021</a:t>
+              <a:t>2/9/2021</a:t>
             </a:fld>
             <a:endParaRPr lang="en-US"/>
           </a:p>
@@ -1414,7 +1416,7 @@
           <a:p>
             <a:fld id="{A0AEBE10-9D9F-4B7B-95CC-EECC3455423B}" type="datetimeFigureOut">
               <a:rPr lang="en-US" smtClean="0"/>
-              <a:t>2/7/2021</a:t>
+              <a:t>2/9/2021</a:t>
             </a:fld>
             <a:endParaRPr lang="en-US"/>
           </a:p>
@@ -1826,7 +1828,7 @@
           <a:p>
             <a:fld id="{A0AEBE10-9D9F-4B7B-95CC-EECC3455423B}" type="datetimeFigureOut">
               <a:rPr lang="en-US" smtClean="0"/>
-              <a:t>2/7/2021</a:t>
+              <a:t>2/9/2021</a:t>
             </a:fld>
             <a:endParaRPr lang="en-US"/>
           </a:p>
@@ -1967,7 +1969,7 @@
           <a:p>
             <a:fld id="{A0AEBE10-9D9F-4B7B-95CC-EECC3455423B}" type="datetimeFigureOut">
               <a:rPr lang="en-US" smtClean="0"/>
-              <a:t>2/7/2021</a:t>
+              <a:t>2/9/2021</a:t>
             </a:fld>
             <a:endParaRPr lang="en-US"/>
           </a:p>
@@ -2080,7 +2082,7 @@
           <a:p>
             <a:fld id="{A0AEBE10-9D9F-4B7B-95CC-EECC3455423B}" type="datetimeFigureOut">
               <a:rPr lang="en-US" smtClean="0"/>
-              <a:t>2/7/2021</a:t>
+              <a:t>2/9/2021</a:t>
             </a:fld>
             <a:endParaRPr lang="en-US"/>
           </a:p>
@@ -2391,7 +2393,7 @@
           <a:p>
             <a:fld id="{A0AEBE10-9D9F-4B7B-95CC-EECC3455423B}" type="datetimeFigureOut">
               <a:rPr lang="en-US" smtClean="0"/>
-              <a:t>2/7/2021</a:t>
+              <a:t>2/9/2021</a:t>
             </a:fld>
             <a:endParaRPr lang="en-US"/>
           </a:p>
@@ -2679,7 +2681,7 @@
           <a:p>
             <a:fld id="{A0AEBE10-9D9F-4B7B-95CC-EECC3455423B}" type="datetimeFigureOut">
               <a:rPr lang="en-US" smtClean="0"/>
-              <a:t>2/7/2021</a:t>
+              <a:t>2/9/2021</a:t>
             </a:fld>
             <a:endParaRPr lang="en-US"/>
           </a:p>
@@ -2920,7 +2922,7 @@
           <a:p>
             <a:fld id="{A0AEBE10-9D9F-4B7B-95CC-EECC3455423B}" type="datetimeFigureOut">
               <a:rPr lang="en-US" smtClean="0"/>
-              <a:t>2/7/2021</a:t>
+              <a:t>2/9/2021</a:t>
             </a:fld>
             <a:endParaRPr lang="en-US"/>
           </a:p>
@@ -4632,7 +4634,7 @@
         </p:blipFill>
         <p:spPr>
           <a:xfrm>
-            <a:off x="1726163" y="342900"/>
+            <a:off x="1981200" y="163286"/>
             <a:ext cx="8229600" cy="6172200"/>
           </a:xfrm>
           <a:prstGeom prst="rect">
@@ -4734,6 +4736,170 @@
     <p:extLst>
       <p:ext uri="{BB962C8B-B14F-4D97-AF65-F5344CB8AC3E}">
         <p14:creationId xmlns:p14="http://schemas.microsoft.com/office/powerpoint/2010/main" val="4149291038"/>
+      </p:ext>
+    </p:extLst>
+  </p:cSld>
+  <p:clrMapOvr>
+    <a:masterClrMapping/>
+  </p:clrMapOvr>
+</p:sld>
+</file>
+
+<file path=ppt/slides/slide13.xml><?xml version="1.0" encoding="utf-8"?>
+<p:sld xmlns:a="http://schemas.openxmlformats.org/drawingml/2006/main" xmlns:r="http://schemas.openxmlformats.org/officeDocument/2006/relationships" xmlns:p="http://schemas.openxmlformats.org/presentationml/2006/main">
+  <p:cSld>
+    <p:spTree>
+      <p:nvGrpSpPr>
+        <p:cNvPr id="1" name=""/>
+        <p:cNvGrpSpPr/>
+        <p:nvPr/>
+      </p:nvGrpSpPr>
+      <p:grpSpPr>
+        <a:xfrm>
+          <a:off x="0" y="0"/>
+          <a:ext cx="0" cy="0"/>
+          <a:chOff x="0" y="0"/>
+          <a:chExt cx="0" cy="0"/>
+        </a:xfrm>
+      </p:grpSpPr>
+      <p:sp>
+        <p:nvSpPr>
+          <p:cNvPr id="4" name="TextBox 3">
+            <a:extLst>
+              <a:ext uri="{FF2B5EF4-FFF2-40B4-BE49-F238E27FC236}">
+                <a16:creationId xmlns:a16="http://schemas.microsoft.com/office/drawing/2014/main" id="{67471DBF-4B7A-455E-952B-58F626BCF459}"/>
+              </a:ext>
+            </a:extLst>
+          </p:cNvPr>
+          <p:cNvSpPr txBox="1"/>
+          <p:nvPr/>
+        </p:nvSpPr>
+        <p:spPr>
+          <a:xfrm>
+            <a:off x="3977952" y="186614"/>
+            <a:ext cx="4945223" cy="707886"/>
+          </a:xfrm>
+          <a:prstGeom prst="rect">
+            <a:avLst/>
+          </a:prstGeom>
+          <a:noFill/>
+        </p:spPr>
+        <p:txBody>
+          <a:bodyPr wrap="square" rtlCol="0">
+            <a:spAutoFit/>
+          </a:bodyPr>
+          <a:lstStyle/>
+          <a:p>
+            <a:r>
+              <a:rPr lang="en-US" sz="4000" dirty="0">
+                <a:latin typeface="Times New Roman" panose="02020603050405020304" pitchFamily="18" charset="0"/>
+                <a:cs typeface="Times New Roman" panose="02020603050405020304" pitchFamily="18" charset="0"/>
+              </a:rPr>
+              <a:t>Variable Duty Cycle </a:t>
+            </a:r>
+            <a:endParaRPr lang="en-US" dirty="0"/>
+          </a:p>
+        </p:txBody>
+      </p:sp>
+      <p:sp>
+        <p:nvSpPr>
+          <p:cNvPr id="5" name="TextBox 4">
+            <a:extLst>
+              <a:ext uri="{FF2B5EF4-FFF2-40B4-BE49-F238E27FC236}">
+                <a16:creationId xmlns:a16="http://schemas.microsoft.com/office/drawing/2014/main" id="{02E79F25-370A-4206-BF5D-551FB13E16FC}"/>
+              </a:ext>
+            </a:extLst>
+          </p:cNvPr>
+          <p:cNvSpPr txBox="1"/>
+          <p:nvPr/>
+        </p:nvSpPr>
+        <p:spPr>
+          <a:xfrm>
+            <a:off x="559837" y="355891"/>
+            <a:ext cx="1567543" cy="369332"/>
+          </a:xfrm>
+          <a:prstGeom prst="rect">
+            <a:avLst/>
+          </a:prstGeom>
+          <a:noFill/>
+        </p:spPr>
+        <p:txBody>
+          <a:bodyPr wrap="square" rtlCol="0">
+            <a:spAutoFit/>
+          </a:bodyPr>
+          <a:lstStyle/>
+          <a:p>
+            <a:r>
+              <a:rPr lang="en-US" dirty="0"/>
+              <a:t>At 80kHz</a:t>
+            </a:r>
+          </a:p>
+        </p:txBody>
+      </p:sp>
+      <p:pic>
+        <p:nvPicPr>
+          <p:cNvPr id="9" name="Picture 8">
+            <a:extLst>
+              <a:ext uri="{FF2B5EF4-FFF2-40B4-BE49-F238E27FC236}">
+                <a16:creationId xmlns:a16="http://schemas.microsoft.com/office/drawing/2014/main" id="{55315696-F2A1-4310-A4B2-53277DF795DC}"/>
+              </a:ext>
+            </a:extLst>
+          </p:cNvPr>
+          <p:cNvPicPr>
+            <a:picLocks noChangeAspect="1"/>
+          </p:cNvPicPr>
+          <p:nvPr/>
+        </p:nvPicPr>
+        <p:blipFill>
+          <a:blip r:embed="rId2"/>
+          <a:stretch>
+            <a:fillRect/>
+          </a:stretch>
+        </p:blipFill>
+        <p:spPr>
+          <a:xfrm>
+            <a:off x="2759237" y="1035698"/>
+            <a:ext cx="5933016" cy="4197185"/>
+          </a:xfrm>
+          <a:prstGeom prst="rect">
+            <a:avLst/>
+          </a:prstGeom>
+        </p:spPr>
+      </p:pic>
+    </p:spTree>
+    <p:extLst>
+      <p:ext uri="{BB962C8B-B14F-4D97-AF65-F5344CB8AC3E}">
+        <p14:creationId xmlns:p14="http://schemas.microsoft.com/office/powerpoint/2010/main" val="3186250951"/>
+      </p:ext>
+    </p:extLst>
+  </p:cSld>
+  <p:clrMapOvr>
+    <a:masterClrMapping/>
+  </p:clrMapOvr>
+</p:sld>
+</file>
+
+<file path=ppt/slides/slide14.xml><?xml version="1.0" encoding="utf-8"?>
+<p:sld xmlns:a="http://schemas.openxmlformats.org/drawingml/2006/main" xmlns:r="http://schemas.openxmlformats.org/officeDocument/2006/relationships" xmlns:p="http://schemas.openxmlformats.org/presentationml/2006/main">
+  <p:cSld>
+    <p:spTree>
+      <p:nvGrpSpPr>
+        <p:cNvPr id="1" name=""/>
+        <p:cNvGrpSpPr/>
+        <p:nvPr/>
+      </p:nvGrpSpPr>
+      <p:grpSpPr>
+        <a:xfrm>
+          <a:off x="0" y="0"/>
+          <a:ext cx="0" cy="0"/>
+          <a:chOff x="0" y="0"/>
+          <a:chExt cx="0" cy="0"/>
+        </a:xfrm>
+      </p:grpSpPr>
+    </p:spTree>
+    <p:extLst>
+      <p:ext uri="{BB962C8B-B14F-4D97-AF65-F5344CB8AC3E}">
+        <p14:creationId xmlns:p14="http://schemas.microsoft.com/office/powerpoint/2010/main" val="3093358462"/>
       </p:ext>
     </p:extLst>
   </p:cSld>

</xml_diff>

<commit_message>
For WPT-Motor Journal, the source file for all figures are created. The simulation also added to the  folder to keep all simulations.
</commit_message>
<xml_diff>
--- a/Presentation/2020.02.08.pptx
+++ b/Presentation/2020.02.08.pptx
@@ -8,17 +8,18 @@
     <p:sldId id="256" r:id="rId2"/>
     <p:sldId id="259" r:id="rId3"/>
     <p:sldId id="257" r:id="rId4"/>
-    <p:sldId id="258" r:id="rId5"/>
-    <p:sldId id="260" r:id="rId6"/>
-    <p:sldId id="261" r:id="rId7"/>
-    <p:sldId id="262" r:id="rId8"/>
-    <p:sldId id="263" r:id="rId9"/>
-    <p:sldId id="265" r:id="rId10"/>
-    <p:sldId id="266" r:id="rId11"/>
-    <p:sldId id="267" r:id="rId12"/>
-    <p:sldId id="264" r:id="rId13"/>
-    <p:sldId id="268" r:id="rId14"/>
-    <p:sldId id="269" r:id="rId15"/>
+    <p:sldId id="270" r:id="rId5"/>
+    <p:sldId id="258" r:id="rId6"/>
+    <p:sldId id="260" r:id="rId7"/>
+    <p:sldId id="261" r:id="rId8"/>
+    <p:sldId id="262" r:id="rId9"/>
+    <p:sldId id="263" r:id="rId10"/>
+    <p:sldId id="265" r:id="rId11"/>
+    <p:sldId id="266" r:id="rId12"/>
+    <p:sldId id="267" r:id="rId13"/>
+    <p:sldId id="264" r:id="rId14"/>
+    <p:sldId id="268" r:id="rId15"/>
+    <p:sldId id="269" r:id="rId16"/>
   </p:sldIdLst>
   <p:sldSz cx="12192000" cy="6858000"/>
   <p:notesSz cx="6858000" cy="9144000"/>
@@ -272,7 +273,7 @@
           <a:p>
             <a:fld id="{A0AEBE10-9D9F-4B7B-95CC-EECC3455423B}" type="datetimeFigureOut">
               <a:rPr lang="en-US" smtClean="0"/>
-              <a:t>2/9/2021</a:t>
+              <a:t>2/13/2021</a:t>
             </a:fld>
             <a:endParaRPr lang="en-US"/>
           </a:p>
@@ -470,7 +471,7 @@
           <a:p>
             <a:fld id="{A0AEBE10-9D9F-4B7B-95CC-EECC3455423B}" type="datetimeFigureOut">
               <a:rPr lang="en-US" smtClean="0"/>
-              <a:t>2/9/2021</a:t>
+              <a:t>2/13/2021</a:t>
             </a:fld>
             <a:endParaRPr lang="en-US"/>
           </a:p>
@@ -678,7 +679,7 @@
           <a:p>
             <a:fld id="{A0AEBE10-9D9F-4B7B-95CC-EECC3455423B}" type="datetimeFigureOut">
               <a:rPr lang="en-US" smtClean="0"/>
-              <a:t>2/9/2021</a:t>
+              <a:t>2/13/2021</a:t>
             </a:fld>
             <a:endParaRPr lang="en-US"/>
           </a:p>
@@ -876,7 +877,7 @@
           <a:p>
             <a:fld id="{A0AEBE10-9D9F-4B7B-95CC-EECC3455423B}" type="datetimeFigureOut">
               <a:rPr lang="en-US" smtClean="0"/>
-              <a:t>2/9/2021</a:t>
+              <a:t>2/13/2021</a:t>
             </a:fld>
             <a:endParaRPr lang="en-US"/>
           </a:p>
@@ -1151,7 +1152,7 @@
           <a:p>
             <a:fld id="{A0AEBE10-9D9F-4B7B-95CC-EECC3455423B}" type="datetimeFigureOut">
               <a:rPr lang="en-US" smtClean="0"/>
-              <a:t>2/9/2021</a:t>
+              <a:t>2/13/2021</a:t>
             </a:fld>
             <a:endParaRPr lang="en-US"/>
           </a:p>
@@ -1416,7 +1417,7 @@
           <a:p>
             <a:fld id="{A0AEBE10-9D9F-4B7B-95CC-EECC3455423B}" type="datetimeFigureOut">
               <a:rPr lang="en-US" smtClean="0"/>
-              <a:t>2/9/2021</a:t>
+              <a:t>2/13/2021</a:t>
             </a:fld>
             <a:endParaRPr lang="en-US"/>
           </a:p>
@@ -1828,7 +1829,7 @@
           <a:p>
             <a:fld id="{A0AEBE10-9D9F-4B7B-95CC-EECC3455423B}" type="datetimeFigureOut">
               <a:rPr lang="en-US" smtClean="0"/>
-              <a:t>2/9/2021</a:t>
+              <a:t>2/13/2021</a:t>
             </a:fld>
             <a:endParaRPr lang="en-US"/>
           </a:p>
@@ -1969,7 +1970,7 @@
           <a:p>
             <a:fld id="{A0AEBE10-9D9F-4B7B-95CC-EECC3455423B}" type="datetimeFigureOut">
               <a:rPr lang="en-US" smtClean="0"/>
-              <a:t>2/9/2021</a:t>
+              <a:t>2/13/2021</a:t>
             </a:fld>
             <a:endParaRPr lang="en-US"/>
           </a:p>
@@ -2082,7 +2083,7 @@
           <a:p>
             <a:fld id="{A0AEBE10-9D9F-4B7B-95CC-EECC3455423B}" type="datetimeFigureOut">
               <a:rPr lang="en-US" smtClean="0"/>
-              <a:t>2/9/2021</a:t>
+              <a:t>2/13/2021</a:t>
             </a:fld>
             <a:endParaRPr lang="en-US"/>
           </a:p>
@@ -2393,7 +2394,7 @@
           <a:p>
             <a:fld id="{A0AEBE10-9D9F-4B7B-95CC-EECC3455423B}" type="datetimeFigureOut">
               <a:rPr lang="en-US" smtClean="0"/>
-              <a:t>2/9/2021</a:t>
+              <a:t>2/13/2021</a:t>
             </a:fld>
             <a:endParaRPr lang="en-US"/>
           </a:p>
@@ -2681,7 +2682,7 @@
           <a:p>
             <a:fld id="{A0AEBE10-9D9F-4B7B-95CC-EECC3455423B}" type="datetimeFigureOut">
               <a:rPr lang="en-US" smtClean="0"/>
-              <a:t>2/9/2021</a:t>
+              <a:t>2/13/2021</a:t>
             </a:fld>
             <a:endParaRPr lang="en-US"/>
           </a:p>
@@ -2922,7 +2923,7 @@
           <a:p>
             <a:fld id="{A0AEBE10-9D9F-4B7B-95CC-EECC3455423B}" type="datetimeFigureOut">
               <a:rPr lang="en-US" smtClean="0"/>
-              <a:t>2/9/2021</a:t>
+              <a:t>2/13/2021</a:t>
             </a:fld>
             <a:endParaRPr lang="en-US"/>
           </a:p>
@@ -4554,10 +4555,10 @@
       </p:grpSpPr>
       <p:pic>
         <p:nvPicPr>
-          <p:cNvPr id="16" name="Picture 15">
-            <a:extLst>
-              <a:ext uri="{FF2B5EF4-FFF2-40B4-BE49-F238E27FC236}">
-                <a16:creationId xmlns:a16="http://schemas.microsoft.com/office/drawing/2014/main" id="{07FE2F52-0176-4131-B58E-128A319307C8}"/>
+          <p:cNvPr id="4" name="Picture 3">
+            <a:extLst>
+              <a:ext uri="{FF2B5EF4-FFF2-40B4-BE49-F238E27FC236}">
+                <a16:creationId xmlns:a16="http://schemas.microsoft.com/office/drawing/2014/main" id="{DC27C569-B002-4331-8529-233790734412}"/>
               </a:ext>
             </a:extLst>
           </p:cNvPr>
@@ -4574,18 +4575,401 @@
         </p:blipFill>
         <p:spPr>
           <a:xfrm>
-            <a:off x="1996751" y="354563"/>
-            <a:ext cx="8198497" cy="6148873"/>
+            <a:off x="164138" y="620488"/>
+            <a:ext cx="5931862" cy="4020716"/>
           </a:xfrm>
           <a:prstGeom prst="rect">
             <a:avLst/>
           </a:prstGeom>
         </p:spPr>
       </p:pic>
+      <p:sp>
+        <p:nvSpPr>
+          <p:cNvPr id="5" name="TextBox 4">
+            <a:extLst>
+              <a:ext uri="{FF2B5EF4-FFF2-40B4-BE49-F238E27FC236}">
+                <a16:creationId xmlns:a16="http://schemas.microsoft.com/office/drawing/2014/main" id="{95F32377-45EB-4FEA-8B96-38070934B223}"/>
+              </a:ext>
+            </a:extLst>
+          </p:cNvPr>
+          <p:cNvSpPr txBox="1"/>
+          <p:nvPr/>
+        </p:nvSpPr>
+        <p:spPr>
+          <a:xfrm>
+            <a:off x="8071682" y="4550813"/>
+            <a:ext cx="3956180" cy="369332"/>
+          </a:xfrm>
+          <a:prstGeom prst="rect">
+            <a:avLst/>
+          </a:prstGeom>
+          <a:noFill/>
+        </p:spPr>
+        <p:txBody>
+          <a:bodyPr wrap="square" rtlCol="0">
+            <a:spAutoFit/>
+          </a:bodyPr>
+          <a:lstStyle/>
+          <a:p>
+            <a:r>
+              <a:rPr lang="en-US" dirty="0"/>
+              <a:t>Constant Frequency</a:t>
+            </a:r>
+          </a:p>
+        </p:txBody>
+      </p:sp>
+      <p:pic>
+        <p:nvPicPr>
+          <p:cNvPr id="6" name="Picture 5">
+            <a:extLst>
+              <a:ext uri="{FF2B5EF4-FFF2-40B4-BE49-F238E27FC236}">
+                <a16:creationId xmlns:a16="http://schemas.microsoft.com/office/drawing/2014/main" id="{967ABE4B-875F-4985-AB45-46CCAE25E98A}"/>
+              </a:ext>
+            </a:extLst>
+          </p:cNvPr>
+          <p:cNvPicPr>
+            <a:picLocks noChangeAspect="1"/>
+          </p:cNvPicPr>
+          <p:nvPr/>
+        </p:nvPicPr>
+        <p:blipFill>
+          <a:blip r:embed="rId3"/>
+          <a:stretch>
+            <a:fillRect/>
+          </a:stretch>
+        </p:blipFill>
+        <p:spPr>
+          <a:xfrm>
+            <a:off x="6451266" y="604739"/>
+            <a:ext cx="5334000" cy="4000500"/>
+          </a:xfrm>
+          <a:prstGeom prst="rect">
+            <a:avLst/>
+          </a:prstGeom>
+        </p:spPr>
+      </p:pic>
+      <p:sp>
+        <p:nvSpPr>
+          <p:cNvPr id="7" name="TextBox 6">
+            <a:extLst>
+              <a:ext uri="{FF2B5EF4-FFF2-40B4-BE49-F238E27FC236}">
+                <a16:creationId xmlns:a16="http://schemas.microsoft.com/office/drawing/2014/main" id="{8A0CC347-7E74-4E39-AB75-E55407161684}"/>
+              </a:ext>
+            </a:extLst>
+          </p:cNvPr>
+          <p:cNvSpPr txBox="1"/>
+          <p:nvPr/>
+        </p:nvSpPr>
+        <p:spPr>
+          <a:xfrm>
+            <a:off x="2233127" y="4587847"/>
+            <a:ext cx="3956180" cy="369332"/>
+          </a:xfrm>
+          <a:prstGeom prst="rect">
+            <a:avLst/>
+          </a:prstGeom>
+          <a:noFill/>
+        </p:spPr>
+        <p:txBody>
+          <a:bodyPr wrap="square" rtlCol="0">
+            <a:spAutoFit/>
+          </a:bodyPr>
+          <a:lstStyle/>
+          <a:p>
+            <a:r>
+              <a:rPr lang="en-US" dirty="0"/>
+              <a:t>Constant Duty Cycle</a:t>
+            </a:r>
+          </a:p>
+        </p:txBody>
+      </p:sp>
+      <p:sp>
+        <p:nvSpPr>
+          <p:cNvPr id="8" name="TextBox 7">
+            <a:extLst>
+              <a:ext uri="{FF2B5EF4-FFF2-40B4-BE49-F238E27FC236}">
+                <a16:creationId xmlns:a16="http://schemas.microsoft.com/office/drawing/2014/main" id="{9A88EBBC-317F-472A-BE4F-FF362FB2C738}"/>
+              </a:ext>
+            </a:extLst>
+          </p:cNvPr>
+          <p:cNvSpPr txBox="1"/>
+          <p:nvPr/>
+        </p:nvSpPr>
+        <p:spPr>
+          <a:xfrm>
+            <a:off x="681135" y="4991878"/>
+            <a:ext cx="5122506" cy="646331"/>
+          </a:xfrm>
+          <a:prstGeom prst="rect">
+            <a:avLst/>
+          </a:prstGeom>
+          <a:noFill/>
+        </p:spPr>
+        <p:txBody>
+          <a:bodyPr wrap="square" rtlCol="0">
+            <a:spAutoFit/>
+          </a:bodyPr>
+          <a:lstStyle/>
+          <a:p>
+            <a:r>
+              <a:rPr lang="en-US" dirty="0"/>
+              <a:t>Minimum frequency 80 </a:t>
+            </a:r>
+            <a:r>
+              <a:rPr lang="en-US" dirty="0" err="1"/>
+              <a:t>khZ</a:t>
+            </a:r>
+            <a:r>
+              <a:rPr lang="en-US" dirty="0"/>
+              <a:t> : Gain 0.52</a:t>
+            </a:r>
+          </a:p>
+          <a:p>
+            <a:r>
+              <a:rPr lang="en-US" dirty="0"/>
+              <a:t>Maximum frequency 110kHz: Gain 0.16</a:t>
+            </a:r>
+          </a:p>
+        </p:txBody>
+      </p:sp>
+      <p:sp>
+        <p:nvSpPr>
+          <p:cNvPr id="9" name="TextBox 8">
+            <a:extLst>
+              <a:ext uri="{FF2B5EF4-FFF2-40B4-BE49-F238E27FC236}">
+                <a16:creationId xmlns:a16="http://schemas.microsoft.com/office/drawing/2014/main" id="{43C3C131-D2D7-424A-B4B3-8AABA586A64E}"/>
+              </a:ext>
+            </a:extLst>
+          </p:cNvPr>
+          <p:cNvSpPr txBox="1"/>
+          <p:nvPr/>
+        </p:nvSpPr>
+        <p:spPr>
+          <a:xfrm>
+            <a:off x="6905356" y="4991877"/>
+            <a:ext cx="5122506" cy="646331"/>
+          </a:xfrm>
+          <a:prstGeom prst="rect">
+            <a:avLst/>
+          </a:prstGeom>
+          <a:noFill/>
+        </p:spPr>
+        <p:txBody>
+          <a:bodyPr wrap="square" rtlCol="0">
+            <a:spAutoFit/>
+          </a:bodyPr>
+          <a:lstStyle/>
+          <a:p>
+            <a:r>
+              <a:rPr lang="en-US" dirty="0"/>
+              <a:t>Minimum duty  0.5: Gain 1.27</a:t>
+            </a:r>
+          </a:p>
+          <a:p>
+            <a:r>
+              <a:rPr lang="en-US" dirty="0"/>
+              <a:t>Maximum duty 0.9: Gain 0.3935</a:t>
+            </a:r>
+          </a:p>
+        </p:txBody>
+      </p:sp>
+      <p:cxnSp>
+        <p:nvCxnSpPr>
+          <p:cNvPr id="11" name="Straight Connector 10">
+            <a:extLst>
+              <a:ext uri="{FF2B5EF4-FFF2-40B4-BE49-F238E27FC236}">
+                <a16:creationId xmlns:a16="http://schemas.microsoft.com/office/drawing/2014/main" id="{19B02DE6-B856-4017-992C-7194955294CB}"/>
+              </a:ext>
+            </a:extLst>
+          </p:cNvPr>
+          <p:cNvCxnSpPr>
+            <a:cxnSpLocks/>
+          </p:cNvCxnSpPr>
+          <p:nvPr/>
+        </p:nvCxnSpPr>
+        <p:spPr>
+          <a:xfrm>
+            <a:off x="4655976" y="5150498"/>
+            <a:ext cx="2249380" cy="317241"/>
+          </a:xfrm>
+          <a:prstGeom prst="line">
+            <a:avLst/>
+          </a:prstGeom>
+        </p:spPr>
+        <p:style>
+          <a:lnRef idx="1">
+            <a:schemeClr val="accent1"/>
+          </a:lnRef>
+          <a:fillRef idx="0">
+            <a:schemeClr val="accent1"/>
+          </a:fillRef>
+          <a:effectRef idx="0">
+            <a:schemeClr val="accent1"/>
+          </a:effectRef>
+          <a:fontRef idx="minor">
+            <a:schemeClr val="tx1"/>
+          </a:fontRef>
+        </p:style>
+      </p:cxnSp>
+      <p:cxnSp>
+        <p:nvCxnSpPr>
+          <p:cNvPr id="13" name="Straight Connector 12">
+            <a:extLst>
+              <a:ext uri="{FF2B5EF4-FFF2-40B4-BE49-F238E27FC236}">
+                <a16:creationId xmlns:a16="http://schemas.microsoft.com/office/drawing/2014/main" id="{49E43A3C-39CE-4813-984E-DA88A7445A71}"/>
+              </a:ext>
+            </a:extLst>
+          </p:cNvPr>
+          <p:cNvCxnSpPr>
+            <a:cxnSpLocks/>
+          </p:cNvCxnSpPr>
+          <p:nvPr/>
+        </p:nvCxnSpPr>
+        <p:spPr>
+          <a:xfrm flipH="1">
+            <a:off x="4655976" y="5150498"/>
+            <a:ext cx="2037886" cy="317241"/>
+          </a:xfrm>
+          <a:prstGeom prst="line">
+            <a:avLst/>
+          </a:prstGeom>
+        </p:spPr>
+        <p:style>
+          <a:lnRef idx="1">
+            <a:schemeClr val="accent1"/>
+          </a:lnRef>
+          <a:fillRef idx="0">
+            <a:schemeClr val="accent1"/>
+          </a:fillRef>
+          <a:effectRef idx="0">
+            <a:schemeClr val="accent1"/>
+          </a:effectRef>
+          <a:fontRef idx="minor">
+            <a:schemeClr val="tx1"/>
+          </a:fontRef>
+        </p:style>
+      </p:cxnSp>
+      <p:sp>
+        <p:nvSpPr>
+          <p:cNvPr id="20" name="TextBox 19">
+            <a:extLst>
+              <a:ext uri="{FF2B5EF4-FFF2-40B4-BE49-F238E27FC236}">
+                <a16:creationId xmlns:a16="http://schemas.microsoft.com/office/drawing/2014/main" id="{F8B2130B-5920-4F4B-950B-73223B70392A}"/>
+              </a:ext>
+            </a:extLst>
+          </p:cNvPr>
+          <p:cNvSpPr txBox="1"/>
+          <p:nvPr/>
+        </p:nvSpPr>
+        <p:spPr>
+          <a:xfrm>
+            <a:off x="4565780" y="5854377"/>
+            <a:ext cx="2964024" cy="369332"/>
+          </a:xfrm>
+          <a:prstGeom prst="rect">
+            <a:avLst/>
+          </a:prstGeom>
+          <a:noFill/>
+        </p:spPr>
+        <p:txBody>
+          <a:bodyPr wrap="square" rtlCol="0">
+            <a:spAutoFit/>
+          </a:bodyPr>
+          <a:lstStyle/>
+          <a:p>
+            <a:r>
+              <a:rPr lang="en-US" dirty="0"/>
+              <a:t>DC gain </a:t>
+            </a:r>
+            <a:r>
+              <a:rPr lang="en-US" dirty="0">
+                <a:sym typeface="Wingdings" panose="05000000000000000000" pitchFamily="2" charset="2"/>
+              </a:rPr>
+              <a:t> 0.6 (maximum) </a:t>
+            </a:r>
+            <a:endParaRPr lang="en-US" dirty="0"/>
+          </a:p>
+        </p:txBody>
+      </p:sp>
+      <p:sp>
+        <p:nvSpPr>
+          <p:cNvPr id="21" name="TextBox 20">
+            <a:extLst>
+              <a:ext uri="{FF2B5EF4-FFF2-40B4-BE49-F238E27FC236}">
+                <a16:creationId xmlns:a16="http://schemas.microsoft.com/office/drawing/2014/main" id="{9B8583C4-A19B-4F46-91E5-52CC3105B1F3}"/>
+              </a:ext>
+            </a:extLst>
+          </p:cNvPr>
+          <p:cNvSpPr txBox="1"/>
+          <p:nvPr/>
+        </p:nvSpPr>
+        <p:spPr>
+          <a:xfrm>
+            <a:off x="4565780" y="6170444"/>
+            <a:ext cx="2833397" cy="369332"/>
+          </a:xfrm>
+          <a:prstGeom prst="rect">
+            <a:avLst/>
+          </a:prstGeom>
+          <a:noFill/>
+        </p:spPr>
+        <p:txBody>
+          <a:bodyPr wrap="square" rtlCol="0">
+            <a:spAutoFit/>
+          </a:bodyPr>
+          <a:lstStyle/>
+          <a:p>
+            <a:r>
+              <a:rPr lang="en-US" dirty="0"/>
+              <a:t>AC gain </a:t>
+            </a:r>
+            <a:r>
+              <a:rPr lang="en-US" dirty="0">
+                <a:sym typeface="Wingdings" panose="05000000000000000000" pitchFamily="2" charset="2"/>
+              </a:rPr>
+              <a:t> 0.20  (constant)</a:t>
+            </a:r>
+            <a:endParaRPr lang="en-US" dirty="0"/>
+          </a:p>
+        </p:txBody>
+      </p:sp>
+      <p:sp>
+        <p:nvSpPr>
+          <p:cNvPr id="22" name="Title 1">
+            <a:extLst>
+              <a:ext uri="{FF2B5EF4-FFF2-40B4-BE49-F238E27FC236}">
+                <a16:creationId xmlns:a16="http://schemas.microsoft.com/office/drawing/2014/main" id="{04E5064E-DEB4-4D58-88CC-B0EA6E749DB6}"/>
+              </a:ext>
+            </a:extLst>
+          </p:cNvPr>
+          <p:cNvSpPr>
+            <a:spLocks noGrp="1"/>
+          </p:cNvSpPr>
+          <p:nvPr>
+            <p:ph type="title"/>
+          </p:nvPr>
+        </p:nvSpPr>
+        <p:spPr>
+          <a:xfrm>
+            <a:off x="3380015" y="83641"/>
+            <a:ext cx="5525278" cy="757627"/>
+          </a:xfrm>
+        </p:spPr>
+        <p:txBody>
+          <a:bodyPr/>
+          <a:lstStyle/>
+          <a:p>
+            <a:r>
+              <a:rPr lang="en-US" dirty="0"/>
+              <a:t>Duty Cycle-Frequency </a:t>
+            </a:r>
+          </a:p>
+        </p:txBody>
+      </p:sp>
     </p:spTree>
     <p:extLst>
       <p:ext uri="{BB962C8B-B14F-4D97-AF65-F5344CB8AC3E}">
-        <p14:creationId xmlns:p14="http://schemas.microsoft.com/office/powerpoint/2010/main" val="3300276160"/>
+        <p14:creationId xmlns:p14="http://schemas.microsoft.com/office/powerpoint/2010/main" val="2262665028"/>
       </p:ext>
     </p:extLst>
   </p:cSld>
@@ -4614,10 +4998,10 @@
       </p:grpSpPr>
       <p:pic>
         <p:nvPicPr>
-          <p:cNvPr id="9" name="Picture 8">
-            <a:extLst>
-              <a:ext uri="{FF2B5EF4-FFF2-40B4-BE49-F238E27FC236}">
-                <a16:creationId xmlns:a16="http://schemas.microsoft.com/office/drawing/2014/main" id="{F02429B1-4313-43BB-843C-C1C6275541DE}"/>
+          <p:cNvPr id="16" name="Picture 15">
+            <a:extLst>
+              <a:ext uri="{FF2B5EF4-FFF2-40B4-BE49-F238E27FC236}">
+                <a16:creationId xmlns:a16="http://schemas.microsoft.com/office/drawing/2014/main" id="{07FE2F52-0176-4131-B58E-128A319307C8}"/>
               </a:ext>
             </a:extLst>
           </p:cNvPr>
@@ -4634,8 +5018,8 @@
         </p:blipFill>
         <p:spPr>
           <a:xfrm>
-            <a:off x="1981200" y="163286"/>
-            <a:ext cx="8229600" cy="6172200"/>
+            <a:off x="1996751" y="354563"/>
+            <a:ext cx="8198497" cy="6148873"/>
           </a:xfrm>
           <a:prstGeom prst="rect">
             <a:avLst/>
@@ -4645,7 +5029,7 @@
     </p:spTree>
     <p:extLst>
       <p:ext uri="{BB962C8B-B14F-4D97-AF65-F5344CB8AC3E}">
-        <p14:creationId xmlns:p14="http://schemas.microsoft.com/office/powerpoint/2010/main" val="238414822"/>
+        <p14:creationId xmlns:p14="http://schemas.microsoft.com/office/powerpoint/2010/main" val="3300276160"/>
       </p:ext>
     </p:extLst>
   </p:cSld>
@@ -4674,10 +5058,10 @@
       </p:grpSpPr>
       <p:pic>
         <p:nvPicPr>
-          <p:cNvPr id="6" name="Picture 5">
-            <a:extLst>
-              <a:ext uri="{FF2B5EF4-FFF2-40B4-BE49-F238E27FC236}">
-                <a16:creationId xmlns:a16="http://schemas.microsoft.com/office/drawing/2014/main" id="{3CD662F6-5D71-495F-8547-58AAA9B15A99}"/>
+          <p:cNvPr id="9" name="Picture 8">
+            <a:extLst>
+              <a:ext uri="{FF2B5EF4-FFF2-40B4-BE49-F238E27FC236}">
+                <a16:creationId xmlns:a16="http://schemas.microsoft.com/office/drawing/2014/main" id="{F02429B1-4313-43BB-843C-C1C6275541DE}"/>
               </a:ext>
             </a:extLst>
           </p:cNvPr>
@@ -4694,38 +5078,8 @@
         </p:blipFill>
         <p:spPr>
           <a:xfrm>
-            <a:off x="1073410" y="811764"/>
-            <a:ext cx="4857748" cy="3643311"/>
-          </a:xfrm>
-          <a:prstGeom prst="rect">
-            <a:avLst/>
-          </a:prstGeom>
-        </p:spPr>
-      </p:pic>
-      <p:pic>
-        <p:nvPicPr>
-          <p:cNvPr id="7" name="Picture 6">
-            <a:extLst>
-              <a:ext uri="{FF2B5EF4-FFF2-40B4-BE49-F238E27FC236}">
-                <a16:creationId xmlns:a16="http://schemas.microsoft.com/office/drawing/2014/main" id="{49EBB398-1461-444E-B1E7-A283DABD5E4A}"/>
-              </a:ext>
-            </a:extLst>
-          </p:cNvPr>
-          <p:cNvPicPr>
-            <a:picLocks noChangeAspect="1"/>
-          </p:cNvPicPr>
-          <p:nvPr/>
-        </p:nvPicPr>
-        <p:blipFill>
-          <a:blip r:embed="rId3"/>
-          <a:stretch>
-            <a:fillRect/>
-          </a:stretch>
-        </p:blipFill>
-        <p:spPr>
-          <a:xfrm>
-            <a:off x="6596742" y="1079872"/>
-            <a:ext cx="4521848" cy="3391386"/>
+            <a:off x="1981200" y="163286"/>
+            <a:ext cx="8229600" cy="6172200"/>
           </a:xfrm>
           <a:prstGeom prst="rect">
             <a:avLst/>
@@ -4735,7 +5089,7 @@
     </p:spTree>
     <p:extLst>
       <p:ext uri="{BB962C8B-B14F-4D97-AF65-F5344CB8AC3E}">
-        <p14:creationId xmlns:p14="http://schemas.microsoft.com/office/powerpoint/2010/main" val="4149291038"/>
+        <p14:creationId xmlns:p14="http://schemas.microsoft.com/office/powerpoint/2010/main" val="238414822"/>
       </p:ext>
     </p:extLst>
   </p:cSld>
@@ -4762,6 +5116,96 @@
           <a:chExt cx="0" cy="0"/>
         </a:xfrm>
       </p:grpSpPr>
+      <p:pic>
+        <p:nvPicPr>
+          <p:cNvPr id="6" name="Picture 5">
+            <a:extLst>
+              <a:ext uri="{FF2B5EF4-FFF2-40B4-BE49-F238E27FC236}">
+                <a16:creationId xmlns:a16="http://schemas.microsoft.com/office/drawing/2014/main" id="{3CD662F6-5D71-495F-8547-58AAA9B15A99}"/>
+              </a:ext>
+            </a:extLst>
+          </p:cNvPr>
+          <p:cNvPicPr>
+            <a:picLocks noChangeAspect="1"/>
+          </p:cNvPicPr>
+          <p:nvPr/>
+        </p:nvPicPr>
+        <p:blipFill>
+          <a:blip r:embed="rId2"/>
+          <a:stretch>
+            <a:fillRect/>
+          </a:stretch>
+        </p:blipFill>
+        <p:spPr>
+          <a:xfrm>
+            <a:off x="1073410" y="811764"/>
+            <a:ext cx="4857748" cy="3643311"/>
+          </a:xfrm>
+          <a:prstGeom prst="rect">
+            <a:avLst/>
+          </a:prstGeom>
+        </p:spPr>
+      </p:pic>
+      <p:pic>
+        <p:nvPicPr>
+          <p:cNvPr id="7" name="Picture 6">
+            <a:extLst>
+              <a:ext uri="{FF2B5EF4-FFF2-40B4-BE49-F238E27FC236}">
+                <a16:creationId xmlns:a16="http://schemas.microsoft.com/office/drawing/2014/main" id="{49EBB398-1461-444E-B1E7-A283DABD5E4A}"/>
+              </a:ext>
+            </a:extLst>
+          </p:cNvPr>
+          <p:cNvPicPr>
+            <a:picLocks noChangeAspect="1"/>
+          </p:cNvPicPr>
+          <p:nvPr/>
+        </p:nvPicPr>
+        <p:blipFill>
+          <a:blip r:embed="rId3"/>
+          <a:stretch>
+            <a:fillRect/>
+          </a:stretch>
+        </p:blipFill>
+        <p:spPr>
+          <a:xfrm>
+            <a:off x="6596742" y="1079872"/>
+            <a:ext cx="4521848" cy="3391386"/>
+          </a:xfrm>
+          <a:prstGeom prst="rect">
+            <a:avLst/>
+          </a:prstGeom>
+        </p:spPr>
+      </p:pic>
+    </p:spTree>
+    <p:extLst>
+      <p:ext uri="{BB962C8B-B14F-4D97-AF65-F5344CB8AC3E}">
+        <p14:creationId xmlns:p14="http://schemas.microsoft.com/office/powerpoint/2010/main" val="4149291038"/>
+      </p:ext>
+    </p:extLst>
+  </p:cSld>
+  <p:clrMapOvr>
+    <a:masterClrMapping/>
+  </p:clrMapOvr>
+</p:sld>
+</file>
+
+<file path=ppt/slides/slide14.xml><?xml version="1.0" encoding="utf-8"?>
+<p:sld xmlns:a="http://schemas.openxmlformats.org/drawingml/2006/main" xmlns:r="http://schemas.openxmlformats.org/officeDocument/2006/relationships" xmlns:p="http://schemas.openxmlformats.org/presentationml/2006/main">
+  <p:cSld>
+    <p:spTree>
+      <p:nvGrpSpPr>
+        <p:cNvPr id="1" name=""/>
+        <p:cNvGrpSpPr/>
+        <p:nvPr/>
+      </p:nvGrpSpPr>
+      <p:grpSpPr>
+        <a:xfrm>
+          <a:off x="0" y="0"/>
+          <a:ext cx="0" cy="0"/>
+          <a:chOff x="0" y="0"/>
+          <a:chExt cx="0" cy="0"/>
+        </a:xfrm>
+      </p:grpSpPr>
       <p:sp>
         <p:nvSpPr>
           <p:cNvPr id="4" name="TextBox 3">
@@ -4879,7 +5323,7 @@
 </p:sld>
 </file>
 
-<file path=ppt/slides/slide14.xml><?xml version="1.0" encoding="utf-8"?>
+<file path=ppt/slides/slide15.xml><?xml version="1.0" encoding="utf-8"?>
 <p:sld xmlns:a="http://schemas.openxmlformats.org/drawingml/2006/main" xmlns:r="http://schemas.openxmlformats.org/officeDocument/2006/relationships" xmlns:p="http://schemas.openxmlformats.org/presentationml/2006/main">
   <p:cSld>
     <p:spTree>
@@ -6172,54 +6616,12 @@
           <a:chExt cx="0" cy="0"/>
         </a:xfrm>
       </p:grpSpPr>
-      <p:sp>
-        <p:nvSpPr>
-          <p:cNvPr id="4" name="TextBox 3">
-            <a:extLst>
-              <a:ext uri="{FF2B5EF4-FFF2-40B4-BE49-F238E27FC236}">
-                <a16:creationId xmlns:a16="http://schemas.microsoft.com/office/drawing/2014/main" id="{80402969-5A6F-4335-8F99-7C12C9B3A70C}"/>
-              </a:ext>
-            </a:extLst>
-          </p:cNvPr>
-          <p:cNvSpPr txBox="1"/>
-          <p:nvPr/>
-        </p:nvSpPr>
-        <p:spPr>
-          <a:xfrm>
-            <a:off x="4304524" y="289250"/>
-            <a:ext cx="4945223" cy="707886"/>
-          </a:xfrm>
-          <a:prstGeom prst="rect">
-            <a:avLst/>
-          </a:prstGeom>
-          <a:noFill/>
-        </p:spPr>
-        <p:txBody>
-          <a:bodyPr wrap="square" rtlCol="0">
-            <a:spAutoFit/>
-          </a:bodyPr>
-          <a:lstStyle/>
-          <a:p>
-            <a:r>
-              <a:rPr lang="en-US" sz="4000" dirty="0">
-                <a:latin typeface="Times New Roman" panose="02020603050405020304" pitchFamily="18" charset="0"/>
-                <a:cs typeface="Times New Roman" panose="02020603050405020304" pitchFamily="18" charset="0"/>
-              </a:rPr>
-              <a:t>Motor Current </a:t>
-            </a:r>
-            <a:r>
-              <a:rPr lang="en-US" dirty="0"/>
-              <a:t> </a:t>
-            </a:r>
-          </a:p>
-        </p:txBody>
-      </p:sp>
       <p:pic>
         <p:nvPicPr>
-          <p:cNvPr id="3" name="Picture 2">
-            <a:extLst>
-              <a:ext uri="{FF2B5EF4-FFF2-40B4-BE49-F238E27FC236}">
-                <a16:creationId xmlns:a16="http://schemas.microsoft.com/office/drawing/2014/main" id="{AE0EE2BF-A6A6-43DB-B94C-D58F4C6804D2}"/>
+          <p:cNvPr id="8" name="Picture 7">
+            <a:extLst>
+              <a:ext uri="{FF2B5EF4-FFF2-40B4-BE49-F238E27FC236}">
+                <a16:creationId xmlns:a16="http://schemas.microsoft.com/office/drawing/2014/main" id="{9D7FE72A-CD8C-4F37-97B4-C259014BA91F}"/>
               </a:ext>
             </a:extLst>
           </p:cNvPr>
@@ -6236,18 +6638,222 @@
         </p:blipFill>
         <p:spPr>
           <a:xfrm>
-            <a:off x="1272711" y="1277051"/>
-            <a:ext cx="9448164" cy="5720907"/>
+            <a:off x="-98593" y="222924"/>
+            <a:ext cx="12085320" cy="5311140"/>
           </a:xfrm>
           <a:prstGeom prst="rect">
             <a:avLst/>
           </a:prstGeom>
         </p:spPr>
       </p:pic>
+      <p:sp>
+        <p:nvSpPr>
+          <p:cNvPr id="10" name="Rectangle 9">
+            <a:extLst>
+              <a:ext uri="{FF2B5EF4-FFF2-40B4-BE49-F238E27FC236}">
+                <a16:creationId xmlns:a16="http://schemas.microsoft.com/office/drawing/2014/main" id="{8F716E6B-98E6-4AA3-A035-96824045C415}"/>
+              </a:ext>
+            </a:extLst>
+          </p:cNvPr>
+          <p:cNvSpPr/>
+          <p:nvPr/>
+        </p:nvSpPr>
+        <p:spPr>
+          <a:xfrm>
+            <a:off x="1399592" y="298580"/>
+            <a:ext cx="3219059" cy="6167534"/>
+          </a:xfrm>
+          <a:prstGeom prst="rect">
+            <a:avLst/>
+          </a:prstGeom>
+          <a:noFill/>
+          <a:ln w="38100">
+            <a:solidFill>
+              <a:srgbClr val="FF8989"/>
+            </a:solidFill>
+            <a:prstDash val="lgDash"/>
+          </a:ln>
+        </p:spPr>
+        <p:style>
+          <a:lnRef idx="2">
+            <a:schemeClr val="accent1">
+              <a:shade val="50000"/>
+            </a:schemeClr>
+          </a:lnRef>
+          <a:fillRef idx="1">
+            <a:schemeClr val="accent1"/>
+          </a:fillRef>
+          <a:effectRef idx="0">
+            <a:schemeClr val="accent1"/>
+          </a:effectRef>
+          <a:fontRef idx="minor">
+            <a:schemeClr val="lt1"/>
+          </a:fontRef>
+        </p:style>
+        <p:txBody>
+          <a:bodyPr rtlCol="0" anchor="ctr"/>
+          <a:lstStyle/>
+          <a:p>
+            <a:pPr algn="ctr"/>
+            <a:endParaRPr lang="en-US"/>
+          </a:p>
+        </p:txBody>
+      </p:sp>
+      <p:sp>
+        <p:nvSpPr>
+          <p:cNvPr id="16" name="TextBox 15">
+            <a:extLst>
+              <a:ext uri="{FF2B5EF4-FFF2-40B4-BE49-F238E27FC236}">
+                <a16:creationId xmlns:a16="http://schemas.microsoft.com/office/drawing/2014/main" id="{DFC2E298-599F-4D79-B0C6-6D0E30185EC1}"/>
+              </a:ext>
+            </a:extLst>
+          </p:cNvPr>
+          <p:cNvSpPr txBox="1"/>
+          <p:nvPr/>
+        </p:nvSpPr>
+        <p:spPr>
+          <a:xfrm>
+            <a:off x="1548881" y="5257065"/>
+            <a:ext cx="2920480" cy="1015663"/>
+          </a:xfrm>
+          <a:prstGeom prst="rect">
+            <a:avLst/>
+          </a:prstGeom>
+          <a:noFill/>
+        </p:spPr>
+        <p:txBody>
+          <a:bodyPr wrap="square" rtlCol="0">
+            <a:spAutoFit/>
+          </a:bodyPr>
+          <a:lstStyle/>
+          <a:p>
+            <a:pPr algn="ctr"/>
+            <a:r>
+              <a:rPr lang="en-US" sz="3000" dirty="0">
+                <a:latin typeface="Times New Roman" panose="02020603050405020304" pitchFamily="18" charset="0"/>
+                <a:cs typeface="Times New Roman" panose="02020603050405020304" pitchFamily="18" charset="0"/>
+              </a:rPr>
+              <a:t>Motor</a:t>
+            </a:r>
+          </a:p>
+          <a:p>
+            <a:pPr algn="ctr"/>
+            <a:r>
+              <a:rPr lang="en-US" sz="3000" dirty="0">
+                <a:latin typeface="Times New Roman" panose="02020603050405020304" pitchFamily="18" charset="0"/>
+                <a:cs typeface="Times New Roman" panose="02020603050405020304" pitchFamily="18" charset="0"/>
+              </a:rPr>
+              <a:t> Operation </a:t>
+            </a:r>
+          </a:p>
+        </p:txBody>
+      </p:sp>
+      <p:sp>
+        <p:nvSpPr>
+          <p:cNvPr id="17" name="Rectangle 16">
+            <a:extLst>
+              <a:ext uri="{FF2B5EF4-FFF2-40B4-BE49-F238E27FC236}">
+                <a16:creationId xmlns:a16="http://schemas.microsoft.com/office/drawing/2014/main" id="{43826970-EAD5-481D-884D-2CD1A557DBDA}"/>
+              </a:ext>
+            </a:extLst>
+          </p:cNvPr>
+          <p:cNvSpPr/>
+          <p:nvPr/>
+        </p:nvSpPr>
+        <p:spPr>
+          <a:xfrm>
+            <a:off x="8733452" y="222924"/>
+            <a:ext cx="2058955" cy="6167534"/>
+          </a:xfrm>
+          <a:prstGeom prst="rect">
+            <a:avLst/>
+          </a:prstGeom>
+          <a:noFill/>
+          <a:ln w="38100">
+            <a:solidFill>
+              <a:srgbClr val="7030A0"/>
+            </a:solidFill>
+            <a:prstDash val="lgDash"/>
+          </a:ln>
+        </p:spPr>
+        <p:style>
+          <a:lnRef idx="2">
+            <a:schemeClr val="accent1">
+              <a:shade val="50000"/>
+            </a:schemeClr>
+          </a:lnRef>
+          <a:fillRef idx="1">
+            <a:schemeClr val="accent1"/>
+          </a:fillRef>
+          <a:effectRef idx="0">
+            <a:schemeClr val="accent1"/>
+          </a:effectRef>
+          <a:fontRef idx="minor">
+            <a:schemeClr val="lt1"/>
+          </a:fontRef>
+        </p:style>
+        <p:txBody>
+          <a:bodyPr rtlCol="0" anchor="ctr"/>
+          <a:lstStyle/>
+          <a:p>
+            <a:pPr algn="ctr"/>
+            <a:endParaRPr lang="en-US"/>
+          </a:p>
+        </p:txBody>
+      </p:sp>
+      <p:sp>
+        <p:nvSpPr>
+          <p:cNvPr id="19" name="TextBox 18">
+            <a:extLst>
+              <a:ext uri="{FF2B5EF4-FFF2-40B4-BE49-F238E27FC236}">
+                <a16:creationId xmlns:a16="http://schemas.microsoft.com/office/drawing/2014/main" id="{90F386B7-B28E-4E76-BBB5-BAA528FFC970}"/>
+              </a:ext>
+            </a:extLst>
+          </p:cNvPr>
+          <p:cNvSpPr txBox="1"/>
+          <p:nvPr/>
+        </p:nvSpPr>
+        <p:spPr>
+          <a:xfrm>
+            <a:off x="8899849" y="5257065"/>
+            <a:ext cx="1726160" cy="1015663"/>
+          </a:xfrm>
+          <a:prstGeom prst="rect">
+            <a:avLst/>
+          </a:prstGeom>
+          <a:noFill/>
+        </p:spPr>
+        <p:txBody>
+          <a:bodyPr wrap="square" rtlCol="0">
+            <a:spAutoFit/>
+          </a:bodyPr>
+          <a:lstStyle/>
+          <a:p>
+            <a:pPr algn="ctr"/>
+            <a:r>
+              <a:rPr lang="en-US" sz="3000" dirty="0">
+                <a:latin typeface="Times New Roman" panose="02020603050405020304" pitchFamily="18" charset="0"/>
+                <a:cs typeface="Times New Roman" panose="02020603050405020304" pitchFamily="18" charset="0"/>
+              </a:rPr>
+              <a:t>WPT </a:t>
+            </a:r>
+          </a:p>
+          <a:p>
+            <a:pPr algn="ctr"/>
+            <a:r>
+              <a:rPr lang="en-US" sz="3000" dirty="0">
+                <a:latin typeface="Times New Roman" panose="02020603050405020304" pitchFamily="18" charset="0"/>
+                <a:cs typeface="Times New Roman" panose="02020603050405020304" pitchFamily="18" charset="0"/>
+              </a:rPr>
+              <a:t>Operation </a:t>
+            </a:r>
+          </a:p>
+        </p:txBody>
+      </p:sp>
     </p:spTree>
     <p:extLst>
       <p:ext uri="{BB962C8B-B14F-4D97-AF65-F5344CB8AC3E}">
-        <p14:creationId xmlns:p14="http://schemas.microsoft.com/office/powerpoint/2010/main" val="996643028"/>
+        <p14:creationId xmlns:p14="http://schemas.microsoft.com/office/powerpoint/2010/main" val="745576930"/>
       </p:ext>
     </p:extLst>
   </p:cSld>
@@ -6288,8 +6894,8 @@
         </p:nvSpPr>
         <p:spPr>
           <a:xfrm>
-            <a:off x="2932925" y="94547"/>
-            <a:ext cx="6323043" cy="707886"/>
+            <a:off x="4304524" y="289250"/>
+            <a:ext cx="4945223" cy="707886"/>
           </a:xfrm>
           <a:prstGeom prst="rect">
             <a:avLst/>
@@ -6307,18 +6913,21 @@
                 <a:latin typeface="Times New Roman" panose="02020603050405020304" pitchFamily="18" charset="0"/>
                 <a:cs typeface="Times New Roman" panose="02020603050405020304" pitchFamily="18" charset="0"/>
               </a:rPr>
-              <a:t>WPT OUTPUT VOLTAGE</a:t>
-            </a:r>
-            <a:endParaRPr lang="en-US" dirty="0"/>
+              <a:t>Motor Current </a:t>
+            </a:r>
+            <a:r>
+              <a:rPr lang="en-US" dirty="0"/>
+              <a:t> </a:t>
+            </a:r>
           </a:p>
         </p:txBody>
       </p:sp>
       <p:pic>
         <p:nvPicPr>
-          <p:cNvPr id="2" name="Picture 1">
-            <a:extLst>
-              <a:ext uri="{FF2B5EF4-FFF2-40B4-BE49-F238E27FC236}">
-                <a16:creationId xmlns:a16="http://schemas.microsoft.com/office/drawing/2014/main" id="{F202BEBF-F4B8-4A1F-B148-DA73EA6080B0}"/>
+          <p:cNvPr id="3" name="Picture 2">
+            <a:extLst>
+              <a:ext uri="{FF2B5EF4-FFF2-40B4-BE49-F238E27FC236}">
+                <a16:creationId xmlns:a16="http://schemas.microsoft.com/office/drawing/2014/main" id="{AE0EE2BF-A6A6-43DB-B94C-D58F4C6804D2}"/>
               </a:ext>
             </a:extLst>
           </p:cNvPr>
@@ -6335,77 +6944,8 @@
         </p:blipFill>
         <p:spPr>
           <a:xfrm>
-            <a:off x="3281264" y="581134"/>
-            <a:ext cx="5110063" cy="2608261"/>
-          </a:xfrm>
-          <a:prstGeom prst="rect">
-            <a:avLst/>
-          </a:prstGeom>
-        </p:spPr>
-      </p:pic>
-      <p:sp>
-        <p:nvSpPr>
-          <p:cNvPr id="6" name="TextBox 5">
-            <a:extLst>
-              <a:ext uri="{FF2B5EF4-FFF2-40B4-BE49-F238E27FC236}">
-                <a16:creationId xmlns:a16="http://schemas.microsoft.com/office/drawing/2014/main" id="{1E0DAFB0-BD54-4EE2-86C7-7CF6EDB05954}"/>
-              </a:ext>
-            </a:extLst>
-          </p:cNvPr>
-          <p:cNvSpPr txBox="1"/>
-          <p:nvPr/>
-        </p:nvSpPr>
-        <p:spPr>
-          <a:xfrm>
-            <a:off x="2872273" y="3075057"/>
-            <a:ext cx="6323043" cy="707886"/>
-          </a:xfrm>
-          <a:prstGeom prst="rect">
-            <a:avLst/>
-          </a:prstGeom>
-          <a:noFill/>
-        </p:spPr>
-        <p:txBody>
-          <a:bodyPr wrap="square" rtlCol="0">
-            <a:spAutoFit/>
-          </a:bodyPr>
-          <a:lstStyle/>
-          <a:p>
-            <a:r>
-              <a:rPr lang="en-US" sz="4000" dirty="0">
-                <a:latin typeface="Times New Roman" panose="02020603050405020304" pitchFamily="18" charset="0"/>
-                <a:cs typeface="Times New Roman" panose="02020603050405020304" pitchFamily="18" charset="0"/>
-              </a:rPr>
-              <a:t>WPT INPUT CURRENT</a:t>
-            </a:r>
-            <a:endParaRPr lang="en-US" dirty="0"/>
-          </a:p>
-        </p:txBody>
-      </p:sp>
-      <p:pic>
-        <p:nvPicPr>
-          <p:cNvPr id="7" name="Picture 6">
-            <a:extLst>
-              <a:ext uri="{FF2B5EF4-FFF2-40B4-BE49-F238E27FC236}">
-                <a16:creationId xmlns:a16="http://schemas.microsoft.com/office/drawing/2014/main" id="{60DCF493-D3AF-4B86-B48B-ED2829AD0849}"/>
-              </a:ext>
-            </a:extLst>
-          </p:cNvPr>
-          <p:cNvPicPr>
-            <a:picLocks noChangeAspect="1"/>
-          </p:cNvPicPr>
-          <p:nvPr/>
-        </p:nvPicPr>
-        <p:blipFill>
-          <a:blip r:embed="rId3"/>
-          <a:stretch>
-            <a:fillRect/>
-          </a:stretch>
-        </p:blipFill>
-        <p:spPr>
-          <a:xfrm>
-            <a:off x="3180234" y="3847823"/>
-            <a:ext cx="5211093" cy="2740905"/>
+            <a:off x="1272711" y="1277051"/>
+            <a:ext cx="9448164" cy="5720907"/>
           </a:xfrm>
           <a:prstGeom prst="rect">
             <a:avLst/>
@@ -6415,7 +6955,7 @@
     </p:spTree>
     <p:extLst>
       <p:ext uri="{BB962C8B-B14F-4D97-AF65-F5344CB8AC3E}">
-        <p14:creationId xmlns:p14="http://schemas.microsoft.com/office/powerpoint/2010/main" val="1431589096"/>
+        <p14:creationId xmlns:p14="http://schemas.microsoft.com/office/powerpoint/2010/main" val="996643028"/>
       </p:ext>
     </p:extLst>
   </p:cSld>
@@ -6447,7 +6987,7 @@
           <p:cNvPr id="4" name="TextBox 3">
             <a:extLst>
               <a:ext uri="{FF2B5EF4-FFF2-40B4-BE49-F238E27FC236}">
-                <a16:creationId xmlns:a16="http://schemas.microsoft.com/office/drawing/2014/main" id="{1C9A48EF-DFF1-42C1-B9A3-4ED891D20272}"/>
+                <a16:creationId xmlns:a16="http://schemas.microsoft.com/office/drawing/2014/main" id="{80402969-5A6F-4335-8F99-7C12C9B3A70C}"/>
               </a:ext>
             </a:extLst>
           </p:cNvPr>
@@ -6456,8 +6996,8 @@
         </p:nvSpPr>
         <p:spPr>
           <a:xfrm>
-            <a:off x="622042" y="206512"/>
-            <a:ext cx="4945223" cy="707886"/>
+            <a:off x="2932925" y="94547"/>
+            <a:ext cx="6323043" cy="707886"/>
           </a:xfrm>
           <a:prstGeom prst="rect">
             <a:avLst/>
@@ -6475,7 +7015,7 @@
                 <a:latin typeface="Times New Roman" panose="02020603050405020304" pitchFamily="18" charset="0"/>
                 <a:cs typeface="Times New Roman" panose="02020603050405020304" pitchFamily="18" charset="0"/>
               </a:rPr>
-              <a:t>Transients</a:t>
+              <a:t>WPT OUTPUT VOLTAGE</a:t>
             </a:r>
             <a:endParaRPr lang="en-US" dirty="0"/>
           </a:p>
@@ -6483,10 +7023,10 @@
       </p:sp>
       <p:pic>
         <p:nvPicPr>
-          <p:cNvPr id="5" name="Picture 4">
-            <a:extLst>
-              <a:ext uri="{FF2B5EF4-FFF2-40B4-BE49-F238E27FC236}">
-                <a16:creationId xmlns:a16="http://schemas.microsoft.com/office/drawing/2014/main" id="{9BAFEDCE-D449-4407-A27D-712551392395}"/>
+          <p:cNvPr id="2" name="Picture 1">
+            <a:extLst>
+              <a:ext uri="{FF2B5EF4-FFF2-40B4-BE49-F238E27FC236}">
+                <a16:creationId xmlns:a16="http://schemas.microsoft.com/office/drawing/2014/main" id="{F202BEBF-F4B8-4A1F-B148-DA73EA6080B0}"/>
               </a:ext>
             </a:extLst>
           </p:cNvPr>
@@ -6503,8 +7043,8 @@
         </p:blipFill>
         <p:spPr>
           <a:xfrm>
-            <a:off x="3875315" y="1129004"/>
-            <a:ext cx="7819052" cy="5522484"/>
+            <a:off x="3075990" y="634615"/>
+            <a:ext cx="5110063" cy="2608261"/>
           </a:xfrm>
           <a:prstGeom prst="rect">
             <a:avLst/>
@@ -6516,7 +7056,7 @@
           <p:cNvPr id="6" name="TextBox 5">
             <a:extLst>
               <a:ext uri="{FF2B5EF4-FFF2-40B4-BE49-F238E27FC236}">
-                <a16:creationId xmlns:a16="http://schemas.microsoft.com/office/drawing/2014/main" id="{8F66BC87-3B4D-47CB-A771-E08D665134B1}"/>
+                <a16:creationId xmlns:a16="http://schemas.microsoft.com/office/drawing/2014/main" id="{1E0DAFB0-BD54-4EE2-86C7-7CF6EDB05954}"/>
               </a:ext>
             </a:extLst>
           </p:cNvPr>
@@ -6525,8 +7065,8 @@
         </p:nvSpPr>
         <p:spPr>
           <a:xfrm>
-            <a:off x="283028" y="3429000"/>
-            <a:ext cx="3281265" cy="646331"/>
+            <a:off x="2872273" y="3075057"/>
+            <a:ext cx="6323043" cy="707886"/>
           </a:xfrm>
           <a:prstGeom prst="rect">
             <a:avLst/>
@@ -6539,310 +7079,51 @@
           </a:bodyPr>
           <a:lstStyle/>
           <a:p>
-            <a:pPr marL="285750" indent="-285750">
-              <a:buFont typeface="Arial" panose="020B0604020202020204" pitchFamily="34" charset="0"/>
-              <a:buChar char="•"/>
-            </a:pPr>
-            <a:r>
-              <a:rPr lang="en-US" dirty="0"/>
-              <a:t>Constant Duty Cycle(0.8)</a:t>
-            </a:r>
-          </a:p>
-          <a:p>
-            <a:pPr marL="285750" indent="-285750">
-              <a:buFont typeface="Arial" panose="020B0604020202020204" pitchFamily="34" charset="0"/>
-              <a:buChar char="•"/>
-            </a:pPr>
-            <a:r>
-              <a:rPr lang="en-US" dirty="0"/>
-              <a:t>Constant Frequency (80kHz)</a:t>
-            </a:r>
-          </a:p>
-        </p:txBody>
-      </p:sp>
-      <p:cxnSp>
-        <p:nvCxnSpPr>
-          <p:cNvPr id="8" name="Straight Arrow Connector 7">
-            <a:extLst>
-              <a:ext uri="{FF2B5EF4-FFF2-40B4-BE49-F238E27FC236}">
-                <a16:creationId xmlns:a16="http://schemas.microsoft.com/office/drawing/2014/main" id="{0073EB64-1B6C-4E4B-AE17-0BF8F12C3B67}"/>
-              </a:ext>
-            </a:extLst>
-          </p:cNvPr>
-          <p:cNvCxnSpPr>
-            <a:cxnSpLocks/>
-          </p:cNvCxnSpPr>
+            <a:r>
+              <a:rPr lang="en-US" sz="4000" dirty="0">
+                <a:latin typeface="Times New Roman" panose="02020603050405020304" pitchFamily="18" charset="0"/>
+                <a:cs typeface="Times New Roman" panose="02020603050405020304" pitchFamily="18" charset="0"/>
+              </a:rPr>
+              <a:t>WPT INPUT CURRENT</a:t>
+            </a:r>
+            <a:endParaRPr lang="en-US" dirty="0"/>
+          </a:p>
+        </p:txBody>
+      </p:sp>
+      <p:pic>
+        <p:nvPicPr>
+          <p:cNvPr id="7" name="Picture 6">
+            <a:extLst>
+              <a:ext uri="{FF2B5EF4-FFF2-40B4-BE49-F238E27FC236}">
+                <a16:creationId xmlns:a16="http://schemas.microsoft.com/office/drawing/2014/main" id="{60DCF493-D3AF-4B86-B48B-ED2829AD0849}"/>
+              </a:ext>
+            </a:extLst>
+          </p:cNvPr>
+          <p:cNvPicPr>
+            <a:picLocks noChangeAspect="1"/>
+          </p:cNvPicPr>
           <p:nvPr/>
-        </p:nvCxnSpPr>
-        <p:spPr>
-          <a:xfrm>
-            <a:off x="8677469" y="793102"/>
-            <a:ext cx="457200" cy="933061"/>
-          </a:xfrm>
-          <a:prstGeom prst="straightConnector1">
-            <a:avLst/>
-          </a:prstGeom>
-          <a:ln w="28575">
-            <a:solidFill>
-              <a:srgbClr val="002060"/>
-            </a:solidFill>
-            <a:tailEnd type="triangle"/>
-          </a:ln>
-        </p:spPr>
-        <p:style>
-          <a:lnRef idx="1">
-            <a:schemeClr val="accent1"/>
-          </a:lnRef>
-          <a:fillRef idx="0">
-            <a:schemeClr val="accent1"/>
-          </a:fillRef>
-          <a:effectRef idx="0">
-            <a:schemeClr val="accent1"/>
-          </a:effectRef>
-          <a:fontRef idx="minor">
-            <a:schemeClr val="tx1"/>
-          </a:fontRef>
-        </p:style>
-      </p:cxnSp>
-      <p:cxnSp>
-        <p:nvCxnSpPr>
-          <p:cNvPr id="10" name="Straight Arrow Connector 9">
-            <a:extLst>
-              <a:ext uri="{FF2B5EF4-FFF2-40B4-BE49-F238E27FC236}">
-                <a16:creationId xmlns:a16="http://schemas.microsoft.com/office/drawing/2014/main" id="{781911AC-6D35-498D-A3A5-3CA03CE9E773}"/>
-              </a:ext>
-            </a:extLst>
-          </p:cNvPr>
-          <p:cNvCxnSpPr>
-            <a:cxnSpLocks/>
-          </p:cNvCxnSpPr>
-          <p:nvPr/>
-        </p:nvCxnSpPr>
-        <p:spPr>
-          <a:xfrm flipH="1">
-            <a:off x="6624736" y="793102"/>
-            <a:ext cx="1250301" cy="923731"/>
-          </a:xfrm>
-          <a:prstGeom prst="straightConnector1">
-            <a:avLst/>
-          </a:prstGeom>
-          <a:ln w="28575">
-            <a:solidFill>
-              <a:srgbClr val="002060"/>
-            </a:solidFill>
-            <a:tailEnd type="triangle"/>
-          </a:ln>
-        </p:spPr>
-        <p:style>
-          <a:lnRef idx="1">
-            <a:schemeClr val="accent1"/>
-          </a:lnRef>
-          <a:fillRef idx="0">
-            <a:schemeClr val="accent1"/>
-          </a:fillRef>
-          <a:effectRef idx="0">
-            <a:schemeClr val="accent1"/>
-          </a:effectRef>
-          <a:fontRef idx="minor">
-            <a:schemeClr val="tx1"/>
-          </a:fontRef>
-        </p:style>
-      </p:cxnSp>
-      <p:sp>
-        <p:nvSpPr>
-          <p:cNvPr id="12" name="TextBox 11">
-            <a:extLst>
-              <a:ext uri="{FF2B5EF4-FFF2-40B4-BE49-F238E27FC236}">
-                <a16:creationId xmlns:a16="http://schemas.microsoft.com/office/drawing/2014/main" id="{2C4ED66A-B85B-4467-A3DE-326566F089C4}"/>
-              </a:ext>
-            </a:extLst>
-          </p:cNvPr>
-          <p:cNvSpPr txBox="1"/>
-          <p:nvPr/>
-        </p:nvSpPr>
-        <p:spPr>
-          <a:xfrm>
-            <a:off x="7784841" y="149071"/>
-            <a:ext cx="1340497" cy="923330"/>
+        </p:nvPicPr>
+        <p:blipFill>
+          <a:blip r:embed="rId3"/>
+          <a:stretch>
+            <a:fillRect/>
+          </a:stretch>
+        </p:blipFill>
+        <p:spPr>
+          <a:xfrm>
+            <a:off x="3152243" y="3782943"/>
+            <a:ext cx="5211093" cy="2740905"/>
           </a:xfrm>
           <a:prstGeom prst="rect">
             <a:avLst/>
           </a:prstGeom>
-          <a:noFill/>
-        </p:spPr>
-        <p:txBody>
-          <a:bodyPr wrap="square" rtlCol="0">
-            <a:spAutoFit/>
-          </a:bodyPr>
-          <a:lstStyle/>
-          <a:p>
-            <a:r>
-              <a:rPr lang="en-US" dirty="0"/>
-              <a:t>Motor load torque changes</a:t>
-            </a:r>
-          </a:p>
-        </p:txBody>
-      </p:sp>
-      <p:cxnSp>
-        <p:nvCxnSpPr>
-          <p:cNvPr id="16" name="Straight Arrow Connector 15">
-            <a:extLst>
-              <a:ext uri="{FF2B5EF4-FFF2-40B4-BE49-F238E27FC236}">
-                <a16:creationId xmlns:a16="http://schemas.microsoft.com/office/drawing/2014/main" id="{0468AB2E-7C63-4242-A704-F63A7EDE468E}"/>
-              </a:ext>
-            </a:extLst>
-          </p:cNvPr>
-          <p:cNvCxnSpPr/>
-          <p:nvPr/>
-        </p:nvCxnSpPr>
-        <p:spPr>
-          <a:xfrm flipV="1">
-            <a:off x="2808514" y="3890246"/>
-            <a:ext cx="3816222" cy="784391"/>
-          </a:xfrm>
-          <a:prstGeom prst="straightConnector1">
-            <a:avLst/>
-          </a:prstGeom>
-          <a:ln w="28575">
-            <a:solidFill>
-              <a:srgbClr val="002060"/>
-            </a:solidFill>
-            <a:tailEnd type="triangle"/>
-          </a:ln>
-        </p:spPr>
-        <p:style>
-          <a:lnRef idx="1">
-            <a:schemeClr val="accent1"/>
-          </a:lnRef>
-          <a:fillRef idx="0">
-            <a:schemeClr val="accent1"/>
-          </a:fillRef>
-          <a:effectRef idx="0">
-            <a:schemeClr val="accent1"/>
-          </a:effectRef>
-          <a:fontRef idx="minor">
-            <a:schemeClr val="tx1"/>
-          </a:fontRef>
-        </p:style>
-      </p:cxnSp>
-      <p:sp>
-        <p:nvSpPr>
-          <p:cNvPr id="17" name="TextBox 16">
-            <a:extLst>
-              <a:ext uri="{FF2B5EF4-FFF2-40B4-BE49-F238E27FC236}">
-                <a16:creationId xmlns:a16="http://schemas.microsoft.com/office/drawing/2014/main" id="{16EDB0BE-6566-4F16-B33D-5C8783467FF4}"/>
-              </a:ext>
-            </a:extLst>
-          </p:cNvPr>
-          <p:cNvSpPr txBox="1"/>
-          <p:nvPr/>
-        </p:nvSpPr>
-        <p:spPr>
-          <a:xfrm>
-            <a:off x="420656" y="4509758"/>
-            <a:ext cx="2620346" cy="369332"/>
-          </a:xfrm>
-          <a:prstGeom prst="rect">
-            <a:avLst/>
-          </a:prstGeom>
-          <a:noFill/>
-        </p:spPr>
-        <p:txBody>
-          <a:bodyPr wrap="square" rtlCol="0">
-            <a:spAutoFit/>
-          </a:bodyPr>
-          <a:lstStyle/>
-          <a:p>
-            <a:r>
-              <a:rPr lang="en-US" dirty="0"/>
-              <a:t>Motor Current changes</a:t>
-            </a:r>
-          </a:p>
-        </p:txBody>
-      </p:sp>
-      <p:cxnSp>
-        <p:nvCxnSpPr>
-          <p:cNvPr id="18" name="Straight Arrow Connector 17">
-            <a:extLst>
-              <a:ext uri="{FF2B5EF4-FFF2-40B4-BE49-F238E27FC236}">
-                <a16:creationId xmlns:a16="http://schemas.microsoft.com/office/drawing/2014/main" id="{78C997FE-9E2D-4121-97A6-04E4AF1065D9}"/>
-              </a:ext>
-            </a:extLst>
-          </p:cNvPr>
-          <p:cNvCxnSpPr>
-            <a:cxnSpLocks/>
-          </p:cNvCxnSpPr>
-          <p:nvPr/>
-        </p:nvCxnSpPr>
-        <p:spPr>
-          <a:xfrm flipV="1">
-            <a:off x="2808514" y="3982790"/>
-            <a:ext cx="6097555" cy="709891"/>
-          </a:xfrm>
-          <a:prstGeom prst="straightConnector1">
-            <a:avLst/>
-          </a:prstGeom>
-          <a:ln w="28575">
-            <a:solidFill>
-              <a:srgbClr val="002060"/>
-            </a:solidFill>
-            <a:tailEnd type="triangle"/>
-          </a:ln>
-        </p:spPr>
-        <p:style>
-          <a:lnRef idx="1">
-            <a:schemeClr val="accent1"/>
-          </a:lnRef>
-          <a:fillRef idx="0">
-            <a:schemeClr val="accent1"/>
-          </a:fillRef>
-          <a:effectRef idx="0">
-            <a:schemeClr val="accent1"/>
-          </a:effectRef>
-          <a:fontRef idx="minor">
-            <a:schemeClr val="tx1"/>
-          </a:fontRef>
-        </p:style>
-      </p:cxnSp>
-      <p:sp>
-        <p:nvSpPr>
-          <p:cNvPr id="21" name="TextBox 20">
-            <a:extLst>
-              <a:ext uri="{FF2B5EF4-FFF2-40B4-BE49-F238E27FC236}">
-                <a16:creationId xmlns:a16="http://schemas.microsoft.com/office/drawing/2014/main" id="{F1F7A91E-F043-44A8-80D2-BAC68A891207}"/>
-              </a:ext>
-            </a:extLst>
-          </p:cNvPr>
-          <p:cNvSpPr txBox="1"/>
-          <p:nvPr/>
-        </p:nvSpPr>
-        <p:spPr>
-          <a:xfrm>
-            <a:off x="283028" y="1432560"/>
-            <a:ext cx="2789855" cy="646331"/>
-          </a:xfrm>
-          <a:prstGeom prst="rect">
-            <a:avLst/>
-          </a:prstGeom>
-          <a:noFill/>
-        </p:spPr>
-        <p:txBody>
-          <a:bodyPr wrap="square" rtlCol="0">
-            <a:spAutoFit/>
-          </a:bodyPr>
-          <a:lstStyle/>
-          <a:p>
-            <a:r>
-              <a:rPr lang="en-US" dirty="0"/>
-              <a:t>WPT does not effected from change on motor load.</a:t>
-            </a:r>
-          </a:p>
-        </p:txBody>
-      </p:sp>
+        </p:spPr>
+      </p:pic>
     </p:spTree>
     <p:extLst>
       <p:ext uri="{BB962C8B-B14F-4D97-AF65-F5344CB8AC3E}">
-        <p14:creationId xmlns:p14="http://schemas.microsoft.com/office/powerpoint/2010/main" val="1489152662"/>
+        <p14:creationId xmlns:p14="http://schemas.microsoft.com/office/powerpoint/2010/main" val="1431589096"/>
       </p:ext>
     </p:extLst>
   </p:cSld>
@@ -6908,61 +7189,12 @@
           </a:p>
         </p:txBody>
       </p:sp>
-      <p:sp>
-        <p:nvSpPr>
-          <p:cNvPr id="6" name="TextBox 5">
-            <a:extLst>
-              <a:ext uri="{FF2B5EF4-FFF2-40B4-BE49-F238E27FC236}">
-                <a16:creationId xmlns:a16="http://schemas.microsoft.com/office/drawing/2014/main" id="{8F66BC87-3B4D-47CB-A771-E08D665134B1}"/>
-              </a:ext>
-            </a:extLst>
-          </p:cNvPr>
-          <p:cNvSpPr txBox="1"/>
-          <p:nvPr/>
-        </p:nvSpPr>
-        <p:spPr>
-          <a:xfrm>
-            <a:off x="0" y="2686553"/>
-            <a:ext cx="3281265" cy="646331"/>
-          </a:xfrm>
-          <a:prstGeom prst="rect">
-            <a:avLst/>
-          </a:prstGeom>
-          <a:noFill/>
-        </p:spPr>
-        <p:txBody>
-          <a:bodyPr wrap="square" rtlCol="0">
-            <a:spAutoFit/>
-          </a:bodyPr>
-          <a:lstStyle/>
-          <a:p>
-            <a:pPr marL="285750" indent="-285750">
-              <a:buFont typeface="Arial" panose="020B0604020202020204" pitchFamily="34" charset="0"/>
-              <a:buChar char="•"/>
-            </a:pPr>
-            <a:r>
-              <a:rPr lang="en-US" dirty="0"/>
-              <a:t>Constant Duty Cycle(0.8)</a:t>
-            </a:r>
-          </a:p>
-          <a:p>
-            <a:pPr marL="285750" indent="-285750">
-              <a:buFont typeface="Arial" panose="020B0604020202020204" pitchFamily="34" charset="0"/>
-              <a:buChar char="•"/>
-            </a:pPr>
-            <a:r>
-              <a:rPr lang="en-US" dirty="0"/>
-              <a:t>Constant Frequency (80kHz)</a:t>
-            </a:r>
-          </a:p>
-        </p:txBody>
-      </p:sp>
       <p:pic>
         <p:nvPicPr>
-          <p:cNvPr id="2" name="Picture 1">
-            <a:extLst>
-              <a:ext uri="{FF2B5EF4-FFF2-40B4-BE49-F238E27FC236}">
-                <a16:creationId xmlns:a16="http://schemas.microsoft.com/office/drawing/2014/main" id="{A48AF190-EFCA-46AC-9235-00E93E81EC8C}"/>
+          <p:cNvPr id="5" name="Picture 4">
+            <a:extLst>
+              <a:ext uri="{FF2B5EF4-FFF2-40B4-BE49-F238E27FC236}">
+                <a16:creationId xmlns:a16="http://schemas.microsoft.com/office/drawing/2014/main" id="{9BAFEDCE-D449-4407-A27D-712551392395}"/>
               </a:ext>
             </a:extLst>
           </p:cNvPr>
@@ -6979,37 +7211,88 @@
         </p:blipFill>
         <p:spPr>
           <a:xfrm>
-            <a:off x="4201304" y="111968"/>
-            <a:ext cx="6922653" cy="6037197"/>
+            <a:off x="3875315" y="1129004"/>
+            <a:ext cx="7819052" cy="5522484"/>
           </a:xfrm>
           <a:prstGeom prst="rect">
             <a:avLst/>
           </a:prstGeom>
         </p:spPr>
       </p:pic>
+      <p:sp>
+        <p:nvSpPr>
+          <p:cNvPr id="6" name="TextBox 5">
+            <a:extLst>
+              <a:ext uri="{FF2B5EF4-FFF2-40B4-BE49-F238E27FC236}">
+                <a16:creationId xmlns:a16="http://schemas.microsoft.com/office/drawing/2014/main" id="{8F66BC87-3B4D-47CB-A771-E08D665134B1}"/>
+              </a:ext>
+            </a:extLst>
+          </p:cNvPr>
+          <p:cNvSpPr txBox="1"/>
+          <p:nvPr/>
+        </p:nvSpPr>
+        <p:spPr>
+          <a:xfrm>
+            <a:off x="283028" y="3429000"/>
+            <a:ext cx="3281265" cy="646331"/>
+          </a:xfrm>
+          <a:prstGeom prst="rect">
+            <a:avLst/>
+          </a:prstGeom>
+          <a:noFill/>
+        </p:spPr>
+        <p:txBody>
+          <a:bodyPr wrap="square" rtlCol="0">
+            <a:spAutoFit/>
+          </a:bodyPr>
+          <a:lstStyle/>
+          <a:p>
+            <a:pPr marL="285750" indent="-285750">
+              <a:buFont typeface="Arial" panose="020B0604020202020204" pitchFamily="34" charset="0"/>
+              <a:buChar char="•"/>
+            </a:pPr>
+            <a:r>
+              <a:rPr lang="en-US" dirty="0"/>
+              <a:t>Constant Duty Cycle(0.8)</a:t>
+            </a:r>
+          </a:p>
+          <a:p>
+            <a:pPr marL="285750" indent="-285750">
+              <a:buFont typeface="Arial" panose="020B0604020202020204" pitchFamily="34" charset="0"/>
+              <a:buChar char="•"/>
+            </a:pPr>
+            <a:r>
+              <a:rPr lang="en-US" dirty="0"/>
+              <a:t>Constant Frequency (80kHz)</a:t>
+            </a:r>
+          </a:p>
+        </p:txBody>
+      </p:sp>
       <p:cxnSp>
         <p:nvCxnSpPr>
-          <p:cNvPr id="7" name="Straight Arrow Connector 6">
-            <a:extLst>
-              <a:ext uri="{FF2B5EF4-FFF2-40B4-BE49-F238E27FC236}">
-                <a16:creationId xmlns:a16="http://schemas.microsoft.com/office/drawing/2014/main" id="{3B384898-91D0-412D-B280-78B1BB89A7CA}"/>
-              </a:ext>
-            </a:extLst>
-          </p:cNvPr>
-          <p:cNvCxnSpPr/>
+          <p:cNvPr id="8" name="Straight Arrow Connector 7">
+            <a:extLst>
+              <a:ext uri="{FF2B5EF4-FFF2-40B4-BE49-F238E27FC236}">
+                <a16:creationId xmlns:a16="http://schemas.microsoft.com/office/drawing/2014/main" id="{0073EB64-1B6C-4E4B-AE17-0BF8F12C3B67}"/>
+              </a:ext>
+            </a:extLst>
+          </p:cNvPr>
+          <p:cNvCxnSpPr>
+            <a:cxnSpLocks/>
+          </p:cNvCxnSpPr>
           <p:nvPr/>
         </p:nvCxnSpPr>
         <p:spPr>
-          <a:xfrm flipV="1">
-            <a:off x="5467738" y="5206482"/>
-            <a:ext cx="503853" cy="1268963"/>
+          <a:xfrm>
+            <a:off x="8677469" y="793102"/>
+            <a:ext cx="457200" cy="933061"/>
           </a:xfrm>
           <a:prstGeom prst="straightConnector1">
             <a:avLst/>
           </a:prstGeom>
-          <a:ln w="38100">
+          <a:ln w="28575">
             <a:solidFill>
-              <a:srgbClr val="7030A0"/>
+              <a:srgbClr val="002060"/>
             </a:solidFill>
             <a:tailEnd type="triangle"/>
           </a:ln>
@@ -7031,10 +7314,10 @@
       </p:cxnSp>
       <p:cxnSp>
         <p:nvCxnSpPr>
-          <p:cNvPr id="14" name="Straight Arrow Connector 13">
-            <a:extLst>
-              <a:ext uri="{FF2B5EF4-FFF2-40B4-BE49-F238E27FC236}">
-                <a16:creationId xmlns:a16="http://schemas.microsoft.com/office/drawing/2014/main" id="{64787C0C-FAFB-4754-BBFB-8C5B56EBE795}"/>
+          <p:cNvPr id="10" name="Straight Arrow Connector 9">
+            <a:extLst>
+              <a:ext uri="{FF2B5EF4-FFF2-40B4-BE49-F238E27FC236}">
+                <a16:creationId xmlns:a16="http://schemas.microsoft.com/office/drawing/2014/main" id="{781911AC-6D35-498D-A3A5-3CA03CE9E773}"/>
               </a:ext>
             </a:extLst>
           </p:cNvPr>
@@ -7044,16 +7327,16 @@
           <p:nvPr/>
         </p:nvCxnSpPr>
         <p:spPr>
-          <a:xfrm flipV="1">
-            <a:off x="7158777" y="5284238"/>
-            <a:ext cx="503853" cy="1191206"/>
+          <a:xfrm flipH="1">
+            <a:off x="6624736" y="793102"/>
+            <a:ext cx="1250301" cy="923731"/>
           </a:xfrm>
           <a:prstGeom prst="straightConnector1">
             <a:avLst/>
           </a:prstGeom>
-          <a:ln w="38100">
+          <a:ln w="28575">
             <a:solidFill>
-              <a:srgbClr val="7030A0"/>
+              <a:srgbClr val="002060"/>
             </a:solidFill>
             <a:tailEnd type="triangle"/>
           </a:ln>
@@ -7073,12 +7356,47 @@
           </a:fontRef>
         </p:style>
       </p:cxnSp>
+      <p:sp>
+        <p:nvSpPr>
+          <p:cNvPr id="12" name="TextBox 11">
+            <a:extLst>
+              <a:ext uri="{FF2B5EF4-FFF2-40B4-BE49-F238E27FC236}">
+                <a16:creationId xmlns:a16="http://schemas.microsoft.com/office/drawing/2014/main" id="{2C4ED66A-B85B-4467-A3DE-326566F089C4}"/>
+              </a:ext>
+            </a:extLst>
+          </p:cNvPr>
+          <p:cNvSpPr txBox="1"/>
+          <p:nvPr/>
+        </p:nvSpPr>
+        <p:spPr>
+          <a:xfrm>
+            <a:off x="7784841" y="149071"/>
+            <a:ext cx="1340497" cy="923330"/>
+          </a:xfrm>
+          <a:prstGeom prst="rect">
+            <a:avLst/>
+          </a:prstGeom>
+          <a:noFill/>
+        </p:spPr>
+        <p:txBody>
+          <a:bodyPr wrap="square" rtlCol="0">
+            <a:spAutoFit/>
+          </a:bodyPr>
+          <a:lstStyle/>
+          <a:p>
+            <a:r>
+              <a:rPr lang="en-US" dirty="0"/>
+              <a:t>Motor load torque changes</a:t>
+            </a:r>
+          </a:p>
+        </p:txBody>
+      </p:sp>
       <p:cxnSp>
         <p:nvCxnSpPr>
-          <p:cNvPr id="19" name="Straight Arrow Connector 18">
-            <a:extLst>
-              <a:ext uri="{FF2B5EF4-FFF2-40B4-BE49-F238E27FC236}">
-                <a16:creationId xmlns:a16="http://schemas.microsoft.com/office/drawing/2014/main" id="{0DAAC6AE-9B4F-4BF0-A6A3-D9B9765F3FCE}"/>
+          <p:cNvPr id="16" name="Straight Arrow Connector 15">
+            <a:extLst>
+              <a:ext uri="{FF2B5EF4-FFF2-40B4-BE49-F238E27FC236}">
+                <a16:creationId xmlns:a16="http://schemas.microsoft.com/office/drawing/2014/main" id="{0468AB2E-7C63-4242-A704-F63A7EDE468E}"/>
               </a:ext>
             </a:extLst>
           </p:cNvPr>
@@ -7087,15 +7405,15 @@
         </p:nvCxnSpPr>
         <p:spPr>
           <a:xfrm flipV="1">
-            <a:off x="8849816" y="5206481"/>
-            <a:ext cx="503853" cy="1268963"/>
+            <a:off x="2808514" y="3890246"/>
+            <a:ext cx="3816222" cy="784391"/>
           </a:xfrm>
           <a:prstGeom prst="straightConnector1">
             <a:avLst/>
           </a:prstGeom>
-          <a:ln w="38100">
+          <a:ln w="28575">
             <a:solidFill>
-              <a:srgbClr val="7030A0"/>
+              <a:srgbClr val="002060"/>
             </a:solidFill>
             <a:tailEnd type="triangle"/>
           </a:ln>
@@ -7117,10 +7435,10 @@
       </p:cxnSp>
       <p:sp>
         <p:nvSpPr>
-          <p:cNvPr id="20" name="TextBox 19">
-            <a:extLst>
-              <a:ext uri="{FF2B5EF4-FFF2-40B4-BE49-F238E27FC236}">
-                <a16:creationId xmlns:a16="http://schemas.microsoft.com/office/drawing/2014/main" id="{48EE7C3A-890D-48B8-A5B5-D3D16FCC045E}"/>
+          <p:cNvPr id="17" name="TextBox 16">
+            <a:extLst>
+              <a:ext uri="{FF2B5EF4-FFF2-40B4-BE49-F238E27FC236}">
+                <a16:creationId xmlns:a16="http://schemas.microsoft.com/office/drawing/2014/main" id="{16EDB0BE-6566-4F16-B33D-5C8783467FF4}"/>
               </a:ext>
             </a:extLst>
           </p:cNvPr>
@@ -7129,8 +7447,8 @@
         </p:nvSpPr>
         <p:spPr>
           <a:xfrm>
-            <a:off x="2380571" y="2202737"/>
-            <a:ext cx="998375" cy="369332"/>
+            <a:off x="420656" y="4509758"/>
+            <a:ext cx="2620346" cy="369332"/>
           </a:xfrm>
           <a:prstGeom prst="rect">
             <a:avLst/>
@@ -7145,17 +7463,17 @@
           <a:p>
             <a:r>
               <a:rPr lang="en-US" dirty="0"/>
-              <a:t>4.5 A</a:t>
+              <a:t>Motor Current changes</a:t>
             </a:r>
           </a:p>
         </p:txBody>
       </p:sp>
       <p:cxnSp>
         <p:nvCxnSpPr>
-          <p:cNvPr id="21" name="Straight Arrow Connector 20">
-            <a:extLst>
-              <a:ext uri="{FF2B5EF4-FFF2-40B4-BE49-F238E27FC236}">
-                <a16:creationId xmlns:a16="http://schemas.microsoft.com/office/drawing/2014/main" id="{D3A6412E-7918-4B1D-A7D5-113D53A4CE9B}"/>
+          <p:cNvPr id="18" name="Straight Arrow Connector 17">
+            <a:extLst>
+              <a:ext uri="{FF2B5EF4-FFF2-40B4-BE49-F238E27FC236}">
+                <a16:creationId xmlns:a16="http://schemas.microsoft.com/office/drawing/2014/main" id="{78C997FE-9E2D-4121-97A6-04E4AF1065D9}"/>
               </a:ext>
             </a:extLst>
           </p:cNvPr>
@@ -7165,16 +7483,16 @@
           <p:nvPr/>
         </p:nvCxnSpPr>
         <p:spPr>
-          <a:xfrm>
-            <a:off x="3094653" y="2478087"/>
-            <a:ext cx="2025987" cy="864247"/>
+          <a:xfrm flipV="1">
+            <a:off x="2808514" y="3982790"/>
+            <a:ext cx="6097555" cy="709891"/>
           </a:xfrm>
           <a:prstGeom prst="straightConnector1">
             <a:avLst/>
           </a:prstGeom>
-          <a:ln w="38100">
+          <a:ln w="28575">
             <a:solidFill>
-              <a:srgbClr val="7030A0"/>
+              <a:srgbClr val="002060"/>
             </a:solidFill>
             <a:tailEnd type="triangle"/>
           </a:ln>
@@ -7194,57 +7512,12 @@
           </a:fontRef>
         </p:style>
       </p:cxnSp>
-      <p:cxnSp>
-        <p:nvCxnSpPr>
-          <p:cNvPr id="24" name="Straight Arrow Connector 23">
-            <a:extLst>
-              <a:ext uri="{FF2B5EF4-FFF2-40B4-BE49-F238E27FC236}">
-                <a16:creationId xmlns:a16="http://schemas.microsoft.com/office/drawing/2014/main" id="{1B6FD373-D4CD-4234-986F-E5DE2B3B99D5}"/>
-              </a:ext>
-            </a:extLst>
-          </p:cNvPr>
-          <p:cNvCxnSpPr>
-            <a:cxnSpLocks/>
-          </p:cNvCxnSpPr>
-          <p:nvPr/>
-        </p:nvCxnSpPr>
-        <p:spPr>
-          <a:xfrm flipV="1">
-            <a:off x="2208245" y="3546806"/>
-            <a:ext cx="3763346" cy="424344"/>
-          </a:xfrm>
-          <a:prstGeom prst="straightConnector1">
-            <a:avLst/>
-          </a:prstGeom>
-          <a:ln w="38100">
-            <a:solidFill>
-              <a:srgbClr val="7030A0"/>
-            </a:solidFill>
-            <a:prstDash val="lgDash"/>
-            <a:tailEnd type="triangle"/>
-          </a:ln>
-        </p:spPr>
-        <p:style>
-          <a:lnRef idx="1">
-            <a:schemeClr val="accent1"/>
-          </a:lnRef>
-          <a:fillRef idx="0">
-            <a:schemeClr val="accent1"/>
-          </a:fillRef>
-          <a:effectRef idx="0">
-            <a:schemeClr val="accent1"/>
-          </a:effectRef>
-          <a:fontRef idx="minor">
-            <a:schemeClr val="tx1"/>
-          </a:fontRef>
-        </p:style>
-      </p:cxnSp>
-      <p:sp>
-        <p:nvSpPr>
-          <p:cNvPr id="27" name="TextBox 26">
-            <a:extLst>
-              <a:ext uri="{FF2B5EF4-FFF2-40B4-BE49-F238E27FC236}">
-                <a16:creationId xmlns:a16="http://schemas.microsoft.com/office/drawing/2014/main" id="{869CA1D0-555C-4D4A-9657-3AC7D2034C7E}"/>
+      <p:sp>
+        <p:nvSpPr>
+          <p:cNvPr id="21" name="TextBox 20">
+            <a:extLst>
+              <a:ext uri="{FF2B5EF4-FFF2-40B4-BE49-F238E27FC236}">
+                <a16:creationId xmlns:a16="http://schemas.microsoft.com/office/drawing/2014/main" id="{F1F7A91E-F043-44A8-80D2-BAC68A891207}"/>
               </a:ext>
             </a:extLst>
           </p:cNvPr>
@@ -7253,8 +7526,8 @@
         </p:nvSpPr>
         <p:spPr>
           <a:xfrm>
-            <a:off x="2408272" y="4247372"/>
-            <a:ext cx="998375" cy="369332"/>
+            <a:off x="283028" y="1432560"/>
+            <a:ext cx="2789855" cy="646331"/>
           </a:xfrm>
           <a:prstGeom prst="rect">
             <a:avLst/>
@@ -7269,307 +7542,7 @@
           <a:p>
             <a:r>
               <a:rPr lang="en-US" dirty="0"/>
-              <a:t>8 A</a:t>
-            </a:r>
-          </a:p>
-        </p:txBody>
-      </p:sp>
-      <p:cxnSp>
-        <p:nvCxnSpPr>
-          <p:cNvPr id="28" name="Straight Arrow Connector 27">
-            <a:extLst>
-              <a:ext uri="{FF2B5EF4-FFF2-40B4-BE49-F238E27FC236}">
-                <a16:creationId xmlns:a16="http://schemas.microsoft.com/office/drawing/2014/main" id="{04CEB38C-4E61-4F6A-8D59-3E10518165A4}"/>
-              </a:ext>
-            </a:extLst>
-          </p:cNvPr>
-          <p:cNvCxnSpPr>
-            <a:cxnSpLocks/>
-          </p:cNvCxnSpPr>
-          <p:nvPr/>
-        </p:nvCxnSpPr>
-        <p:spPr>
-          <a:xfrm flipV="1">
-            <a:off x="2907459" y="3629608"/>
-            <a:ext cx="6367170" cy="1293063"/>
-          </a:xfrm>
-          <a:prstGeom prst="straightConnector1">
-            <a:avLst/>
-          </a:prstGeom>
-          <a:ln w="38100">
-            <a:solidFill>
-              <a:srgbClr val="7030A0"/>
-            </a:solidFill>
-            <a:prstDash val="lgDash"/>
-            <a:tailEnd type="triangle"/>
-          </a:ln>
-        </p:spPr>
-        <p:style>
-          <a:lnRef idx="1">
-            <a:schemeClr val="accent1"/>
-          </a:lnRef>
-          <a:fillRef idx="0">
-            <a:schemeClr val="accent1"/>
-          </a:fillRef>
-          <a:effectRef idx="0">
-            <a:schemeClr val="accent1"/>
-          </a:effectRef>
-          <a:fontRef idx="minor">
-            <a:schemeClr val="tx1"/>
-          </a:fontRef>
-        </p:style>
-      </p:cxnSp>
-      <p:sp>
-        <p:nvSpPr>
-          <p:cNvPr id="31" name="TextBox 30">
-            <a:extLst>
-              <a:ext uri="{FF2B5EF4-FFF2-40B4-BE49-F238E27FC236}">
-                <a16:creationId xmlns:a16="http://schemas.microsoft.com/office/drawing/2014/main" id="{8A1A4489-A18B-4DC6-8ED7-02B7DA244516}"/>
-              </a:ext>
-            </a:extLst>
-          </p:cNvPr>
-          <p:cNvSpPr txBox="1"/>
-          <p:nvPr/>
-        </p:nvSpPr>
-        <p:spPr>
-          <a:xfrm>
-            <a:off x="2308920" y="4794379"/>
-            <a:ext cx="998375" cy="369332"/>
-          </a:xfrm>
-          <a:prstGeom prst="rect">
-            <a:avLst/>
-          </a:prstGeom>
-          <a:noFill/>
-        </p:spPr>
-        <p:txBody>
-          <a:bodyPr wrap="square" rtlCol="0">
-            <a:spAutoFit/>
-          </a:bodyPr>
-          <a:lstStyle/>
-          <a:p>
-            <a:r>
-              <a:rPr lang="en-US" dirty="0"/>
-              <a:t>1 A</a:t>
-            </a:r>
-          </a:p>
-        </p:txBody>
-      </p:sp>
-      <p:sp>
-        <p:nvSpPr>
-          <p:cNvPr id="32" name="TextBox 31">
-            <a:extLst>
-              <a:ext uri="{FF2B5EF4-FFF2-40B4-BE49-F238E27FC236}">
-                <a16:creationId xmlns:a16="http://schemas.microsoft.com/office/drawing/2014/main" id="{A0D98680-2EF5-4367-95AD-6F109CB5DA0C}"/>
-              </a:ext>
-            </a:extLst>
-          </p:cNvPr>
-          <p:cNvSpPr txBox="1"/>
-          <p:nvPr/>
-        </p:nvSpPr>
-        <p:spPr>
-          <a:xfrm>
-            <a:off x="4745713" y="6376700"/>
-            <a:ext cx="1819471" cy="369332"/>
-          </a:xfrm>
-          <a:prstGeom prst="rect">
-            <a:avLst/>
-          </a:prstGeom>
-          <a:noFill/>
-        </p:spPr>
-        <p:txBody>
-          <a:bodyPr wrap="square" rtlCol="0">
-            <a:spAutoFit/>
-          </a:bodyPr>
-          <a:lstStyle/>
-          <a:p>
-            <a:r>
-              <a:rPr lang="en-US" dirty="0"/>
-              <a:t>Half-Resistance</a:t>
-            </a:r>
-          </a:p>
-        </p:txBody>
-      </p:sp>
-      <p:sp>
-        <p:nvSpPr>
-          <p:cNvPr id="33" name="TextBox 32">
-            <a:extLst>
-              <a:ext uri="{FF2B5EF4-FFF2-40B4-BE49-F238E27FC236}">
-                <a16:creationId xmlns:a16="http://schemas.microsoft.com/office/drawing/2014/main" id="{8F3BDA1A-97E4-4919-AA08-3BFBD4EF808B}"/>
-              </a:ext>
-            </a:extLst>
-          </p:cNvPr>
-          <p:cNvSpPr txBox="1"/>
-          <p:nvPr/>
-        </p:nvSpPr>
-        <p:spPr>
-          <a:xfrm>
-            <a:off x="6693616" y="6389922"/>
-            <a:ext cx="1819471" cy="369332"/>
-          </a:xfrm>
-          <a:prstGeom prst="rect">
-            <a:avLst/>
-          </a:prstGeom>
-          <a:noFill/>
-        </p:spPr>
-        <p:txBody>
-          <a:bodyPr wrap="square" rtlCol="0">
-            <a:spAutoFit/>
-          </a:bodyPr>
-          <a:lstStyle/>
-          <a:p>
-            <a:r>
-              <a:rPr lang="en-US" dirty="0"/>
-              <a:t>Short</a:t>
-            </a:r>
-          </a:p>
-        </p:txBody>
-      </p:sp>
-      <p:sp>
-        <p:nvSpPr>
-          <p:cNvPr id="34" name="TextBox 33">
-            <a:extLst>
-              <a:ext uri="{FF2B5EF4-FFF2-40B4-BE49-F238E27FC236}">
-                <a16:creationId xmlns:a16="http://schemas.microsoft.com/office/drawing/2014/main" id="{BC89DDD1-7C50-4E2B-BB17-550887D68640}"/>
-              </a:ext>
-            </a:extLst>
-          </p:cNvPr>
-          <p:cNvSpPr txBox="1"/>
-          <p:nvPr/>
-        </p:nvSpPr>
-        <p:spPr>
-          <a:xfrm>
-            <a:off x="8256223" y="6376700"/>
-            <a:ext cx="1819471" cy="369332"/>
-          </a:xfrm>
-          <a:prstGeom prst="rect">
-            <a:avLst/>
-          </a:prstGeom>
-          <a:noFill/>
-        </p:spPr>
-        <p:txBody>
-          <a:bodyPr wrap="square" rtlCol="0">
-            <a:spAutoFit/>
-          </a:bodyPr>
-          <a:lstStyle/>
-          <a:p>
-            <a:r>
-              <a:rPr lang="en-US" dirty="0"/>
-              <a:t>Open</a:t>
-            </a:r>
-          </a:p>
-        </p:txBody>
-      </p:sp>
-      <p:cxnSp>
-        <p:nvCxnSpPr>
-          <p:cNvPr id="37" name="Straight Arrow Connector 36">
-            <a:extLst>
-              <a:ext uri="{FF2B5EF4-FFF2-40B4-BE49-F238E27FC236}">
-                <a16:creationId xmlns:a16="http://schemas.microsoft.com/office/drawing/2014/main" id="{494E9548-A830-4EEF-AE73-7E560FD42DEF}"/>
-              </a:ext>
-            </a:extLst>
-          </p:cNvPr>
-          <p:cNvCxnSpPr>
-            <a:cxnSpLocks/>
-          </p:cNvCxnSpPr>
-          <p:nvPr/>
-        </p:nvCxnSpPr>
-        <p:spPr>
-          <a:xfrm flipV="1">
-            <a:off x="2951584" y="3483428"/>
-            <a:ext cx="4863446" cy="933062"/>
-          </a:xfrm>
-          <a:prstGeom prst="straightConnector1">
-            <a:avLst/>
-          </a:prstGeom>
-          <a:ln w="38100">
-            <a:solidFill>
-              <a:srgbClr val="7030A0"/>
-            </a:solidFill>
-            <a:prstDash val="lgDash"/>
-            <a:tailEnd type="triangle"/>
-          </a:ln>
-        </p:spPr>
-        <p:style>
-          <a:lnRef idx="1">
-            <a:schemeClr val="accent1"/>
-          </a:lnRef>
-          <a:fillRef idx="0">
-            <a:schemeClr val="accent1"/>
-          </a:fillRef>
-          <a:effectRef idx="0">
-            <a:schemeClr val="accent1"/>
-          </a:effectRef>
-          <a:fontRef idx="minor">
-            <a:schemeClr val="tx1"/>
-          </a:fontRef>
-        </p:style>
-      </p:cxnSp>
-      <p:sp>
-        <p:nvSpPr>
-          <p:cNvPr id="40" name="TextBox 39">
-            <a:extLst>
-              <a:ext uri="{FF2B5EF4-FFF2-40B4-BE49-F238E27FC236}">
-                <a16:creationId xmlns:a16="http://schemas.microsoft.com/office/drawing/2014/main" id="{5A276FC0-1E2F-4513-BBCD-B7E55EF25A30}"/>
-              </a:ext>
-            </a:extLst>
-          </p:cNvPr>
-          <p:cNvSpPr txBox="1"/>
-          <p:nvPr/>
-        </p:nvSpPr>
-        <p:spPr>
-          <a:xfrm>
-            <a:off x="1709057" y="3765293"/>
-            <a:ext cx="998375" cy="369332"/>
-          </a:xfrm>
-          <a:prstGeom prst="rect">
-            <a:avLst/>
-          </a:prstGeom>
-          <a:noFill/>
-        </p:spPr>
-        <p:txBody>
-          <a:bodyPr wrap="square" rtlCol="0">
-            <a:spAutoFit/>
-          </a:bodyPr>
-          <a:lstStyle/>
-          <a:p>
-            <a:r>
-              <a:rPr lang="en-US" dirty="0"/>
-              <a:t>5 A</a:t>
-            </a:r>
-          </a:p>
-        </p:txBody>
-      </p:sp>
-      <p:sp>
-        <p:nvSpPr>
-          <p:cNvPr id="42" name="TextBox 41">
-            <a:extLst>
-              <a:ext uri="{FF2B5EF4-FFF2-40B4-BE49-F238E27FC236}">
-                <a16:creationId xmlns:a16="http://schemas.microsoft.com/office/drawing/2014/main" id="{C5FA646E-521C-4297-8944-54BD88C5BD76}"/>
-              </a:ext>
-            </a:extLst>
-          </p:cNvPr>
-          <p:cNvSpPr txBox="1"/>
-          <p:nvPr/>
-        </p:nvSpPr>
-        <p:spPr>
-          <a:xfrm>
-            <a:off x="304798" y="881313"/>
-            <a:ext cx="2789855" cy="646331"/>
-          </a:xfrm>
-          <a:prstGeom prst="rect">
-            <a:avLst/>
-          </a:prstGeom>
-          <a:noFill/>
-        </p:spPr>
-        <p:txBody>
-          <a:bodyPr wrap="square" rtlCol="0">
-            <a:spAutoFit/>
-          </a:bodyPr>
-          <a:lstStyle/>
-          <a:p>
-            <a:r>
-              <a:rPr lang="en-US" dirty="0"/>
-              <a:t>Motor effected from change on WPT  load.</a:t>
+              <a:t>WPT does not effected from change on motor load.</a:t>
             </a:r>
           </a:p>
         </p:txBody>
@@ -7577,7 +7550,7 @@
     </p:spTree>
     <p:extLst>
       <p:ext uri="{BB962C8B-B14F-4D97-AF65-F5344CB8AC3E}">
-        <p14:creationId xmlns:p14="http://schemas.microsoft.com/office/powerpoint/2010/main" val="1893470800"/>
+        <p14:creationId xmlns:p14="http://schemas.microsoft.com/office/powerpoint/2010/main" val="1489152662"/>
       </p:ext>
     </p:extLst>
   </p:cSld>
@@ -7609,7 +7582,7 @@
           <p:cNvPr id="4" name="TextBox 3">
             <a:extLst>
               <a:ext uri="{FF2B5EF4-FFF2-40B4-BE49-F238E27FC236}">
-                <a16:creationId xmlns:a16="http://schemas.microsoft.com/office/drawing/2014/main" id="{A6F86759-0562-470F-8D29-6FB65959BBB5}"/>
+                <a16:creationId xmlns:a16="http://schemas.microsoft.com/office/drawing/2014/main" id="{1C9A48EF-DFF1-42C1-B9A3-4ED891D20272}"/>
               </a:ext>
             </a:extLst>
           </p:cNvPr>
@@ -7618,7 +7591,7 @@
         </p:nvSpPr>
         <p:spPr>
           <a:xfrm>
-            <a:off x="3921969" y="139961"/>
+            <a:off x="622042" y="206512"/>
             <a:ext cx="4945223" cy="707886"/>
           </a:xfrm>
           <a:prstGeom prst="rect">
@@ -7637,21 +7610,67 @@
                 <a:latin typeface="Times New Roman" panose="02020603050405020304" pitchFamily="18" charset="0"/>
                 <a:cs typeface="Times New Roman" panose="02020603050405020304" pitchFamily="18" charset="0"/>
               </a:rPr>
-              <a:t>Impedance Modelling</a:t>
-            </a:r>
+              <a:t>Transients</a:t>
+            </a:r>
+            <a:endParaRPr lang="en-US" dirty="0"/>
+          </a:p>
+        </p:txBody>
+      </p:sp>
+      <p:sp>
+        <p:nvSpPr>
+          <p:cNvPr id="6" name="TextBox 5">
+            <a:extLst>
+              <a:ext uri="{FF2B5EF4-FFF2-40B4-BE49-F238E27FC236}">
+                <a16:creationId xmlns:a16="http://schemas.microsoft.com/office/drawing/2014/main" id="{8F66BC87-3B4D-47CB-A771-E08D665134B1}"/>
+              </a:ext>
+            </a:extLst>
+          </p:cNvPr>
+          <p:cNvSpPr txBox="1"/>
+          <p:nvPr/>
+        </p:nvSpPr>
+        <p:spPr>
+          <a:xfrm>
+            <a:off x="0" y="2686553"/>
+            <a:ext cx="3281265" cy="646331"/>
+          </a:xfrm>
+          <a:prstGeom prst="rect">
+            <a:avLst/>
+          </a:prstGeom>
+          <a:noFill/>
+        </p:spPr>
+        <p:txBody>
+          <a:bodyPr wrap="square" rtlCol="0">
+            <a:spAutoFit/>
+          </a:bodyPr>
+          <a:lstStyle/>
+          <a:p>
+            <a:pPr marL="285750" indent="-285750">
+              <a:buFont typeface="Arial" panose="020B0604020202020204" pitchFamily="34" charset="0"/>
+              <a:buChar char="•"/>
+            </a:pPr>
             <a:r>
               <a:rPr lang="en-US" dirty="0"/>
-              <a:t> </a:t>
+              <a:t>Constant Duty Cycle(0.8)</a:t>
+            </a:r>
+          </a:p>
+          <a:p>
+            <a:pPr marL="285750" indent="-285750">
+              <a:buFont typeface="Arial" panose="020B0604020202020204" pitchFamily="34" charset="0"/>
+              <a:buChar char="•"/>
+            </a:pPr>
+            <a:r>
+              <a:rPr lang="en-US" dirty="0"/>
+              <a:t>Constant Frequency (80kHz)</a:t>
             </a:r>
           </a:p>
         </p:txBody>
       </p:sp>
       <p:pic>
         <p:nvPicPr>
-          <p:cNvPr id="5" name="Picture 4">
-            <a:extLst>
-              <a:ext uri="{FF2B5EF4-FFF2-40B4-BE49-F238E27FC236}">
-                <a16:creationId xmlns:a16="http://schemas.microsoft.com/office/drawing/2014/main" id="{76079B00-C787-4413-A2DE-16BE4E059637}"/>
+          <p:cNvPr id="2" name="Picture 1">
+            <a:extLst>
+              <a:ext uri="{FF2B5EF4-FFF2-40B4-BE49-F238E27FC236}">
+                <a16:creationId xmlns:a16="http://schemas.microsoft.com/office/drawing/2014/main" id="{A48AF190-EFCA-46AC-9235-00E93E81EC8C}"/>
               </a:ext>
             </a:extLst>
           </p:cNvPr>
@@ -7668,8 +7687,8 @@
         </p:blipFill>
         <p:spPr>
           <a:xfrm>
-            <a:off x="1402080" y="1247769"/>
-            <a:ext cx="9641840" cy="4700397"/>
+            <a:off x="4201304" y="111968"/>
+            <a:ext cx="6922653" cy="6037197"/>
           </a:xfrm>
           <a:prstGeom prst="rect">
             <a:avLst/>
@@ -7681,24 +7700,22 @@
           <p:cNvPr id="7" name="Straight Arrow Connector 6">
             <a:extLst>
               <a:ext uri="{FF2B5EF4-FFF2-40B4-BE49-F238E27FC236}">
-                <a16:creationId xmlns:a16="http://schemas.microsoft.com/office/drawing/2014/main" id="{E97368EB-38D6-4262-9B2A-E4D5EC0B87FD}"/>
-              </a:ext>
-            </a:extLst>
-          </p:cNvPr>
-          <p:cNvCxnSpPr>
-            <a:cxnSpLocks/>
-          </p:cNvCxnSpPr>
+                <a16:creationId xmlns:a16="http://schemas.microsoft.com/office/drawing/2014/main" id="{3B384898-91D0-412D-B280-78B1BB89A7CA}"/>
+              </a:ext>
+            </a:extLst>
+          </p:cNvPr>
+          <p:cNvCxnSpPr/>
           <p:nvPr/>
         </p:nvCxnSpPr>
         <p:spPr>
-          <a:xfrm flipH="1" flipV="1">
-            <a:off x="8778240" y="4754880"/>
-            <a:ext cx="914400" cy="1310640"/>
+          <a:xfrm flipV="1">
+            <a:off x="5467738" y="5206482"/>
+            <a:ext cx="503853" cy="1268963"/>
           </a:xfrm>
           <a:prstGeom prst="straightConnector1">
             <a:avLst/>
           </a:prstGeom>
-          <a:ln w="28575">
+          <a:ln w="38100">
             <a:solidFill>
               <a:srgbClr val="7030A0"/>
             </a:solidFill>
@@ -7720,47 +7737,12 @@
           </a:fontRef>
         </p:style>
       </p:cxnSp>
-      <p:sp>
-        <p:nvSpPr>
-          <p:cNvPr id="10" name="TextBox 9">
-            <a:extLst>
-              <a:ext uri="{FF2B5EF4-FFF2-40B4-BE49-F238E27FC236}">
-                <a16:creationId xmlns:a16="http://schemas.microsoft.com/office/drawing/2014/main" id="{267F007D-158C-44BB-8C3C-389452F673E2}"/>
-              </a:ext>
-            </a:extLst>
-          </p:cNvPr>
-          <p:cNvSpPr txBox="1"/>
-          <p:nvPr/>
-        </p:nvSpPr>
-        <p:spPr>
-          <a:xfrm>
-            <a:off x="9753600" y="5748378"/>
-            <a:ext cx="1290320" cy="923330"/>
-          </a:xfrm>
-          <a:prstGeom prst="rect">
-            <a:avLst/>
-          </a:prstGeom>
-          <a:noFill/>
-        </p:spPr>
-        <p:txBody>
-          <a:bodyPr wrap="square" rtlCol="0">
-            <a:spAutoFit/>
-          </a:bodyPr>
-          <a:lstStyle/>
-          <a:p>
-            <a:r>
-              <a:rPr lang="en-US" dirty="0"/>
-              <a:t>Behaves like short if short</a:t>
-            </a:r>
-          </a:p>
-        </p:txBody>
-      </p:sp>
       <p:cxnSp>
         <p:nvCxnSpPr>
-          <p:cNvPr id="11" name="Straight Arrow Connector 10">
-            <a:extLst>
-              <a:ext uri="{FF2B5EF4-FFF2-40B4-BE49-F238E27FC236}">
-                <a16:creationId xmlns:a16="http://schemas.microsoft.com/office/drawing/2014/main" id="{E820953E-5CAE-4588-BDDC-3C8EAB493CE1}"/>
+          <p:cNvPr id="14" name="Straight Arrow Connector 13">
+            <a:extLst>
+              <a:ext uri="{FF2B5EF4-FFF2-40B4-BE49-F238E27FC236}">
+                <a16:creationId xmlns:a16="http://schemas.microsoft.com/office/drawing/2014/main" id="{64787C0C-FAFB-4754-BBFB-8C5B56EBE795}"/>
               </a:ext>
             </a:extLst>
           </p:cNvPr>
@@ -7771,13 +7753,13 @@
         </p:nvCxnSpPr>
         <p:spPr>
           <a:xfrm flipV="1">
-            <a:off x="7813040" y="5159575"/>
-            <a:ext cx="822960" cy="1150362"/>
+            <a:off x="7158777" y="5284238"/>
+            <a:ext cx="503853" cy="1191206"/>
           </a:xfrm>
           <a:prstGeom prst="straightConnector1">
             <a:avLst/>
           </a:prstGeom>
-          <a:ln w="28575">
+          <a:ln w="38100">
             <a:solidFill>
               <a:srgbClr val="7030A0"/>
             </a:solidFill>
@@ -7799,12 +7781,54 @@
           </a:fontRef>
         </p:style>
       </p:cxnSp>
-      <p:sp>
-        <p:nvSpPr>
-          <p:cNvPr id="14" name="TextBox 13">
-            <a:extLst>
-              <a:ext uri="{FF2B5EF4-FFF2-40B4-BE49-F238E27FC236}">
-                <a16:creationId xmlns:a16="http://schemas.microsoft.com/office/drawing/2014/main" id="{19E00A61-429F-48DC-9250-01F886F1166E}"/>
+      <p:cxnSp>
+        <p:nvCxnSpPr>
+          <p:cNvPr id="19" name="Straight Arrow Connector 18">
+            <a:extLst>
+              <a:ext uri="{FF2B5EF4-FFF2-40B4-BE49-F238E27FC236}">
+                <a16:creationId xmlns:a16="http://schemas.microsoft.com/office/drawing/2014/main" id="{0DAAC6AE-9B4F-4BF0-A6A3-D9B9765F3FCE}"/>
+              </a:ext>
+            </a:extLst>
+          </p:cNvPr>
+          <p:cNvCxnSpPr/>
+          <p:nvPr/>
+        </p:nvCxnSpPr>
+        <p:spPr>
+          <a:xfrm flipV="1">
+            <a:off x="8849816" y="5206481"/>
+            <a:ext cx="503853" cy="1268963"/>
+          </a:xfrm>
+          <a:prstGeom prst="straightConnector1">
+            <a:avLst/>
+          </a:prstGeom>
+          <a:ln w="38100">
+            <a:solidFill>
+              <a:srgbClr val="7030A0"/>
+            </a:solidFill>
+            <a:tailEnd type="triangle"/>
+          </a:ln>
+        </p:spPr>
+        <p:style>
+          <a:lnRef idx="1">
+            <a:schemeClr val="accent1"/>
+          </a:lnRef>
+          <a:fillRef idx="0">
+            <a:schemeClr val="accent1"/>
+          </a:fillRef>
+          <a:effectRef idx="0">
+            <a:schemeClr val="accent1"/>
+          </a:effectRef>
+          <a:fontRef idx="minor">
+            <a:schemeClr val="tx1"/>
+          </a:fontRef>
+        </p:style>
+      </p:cxnSp>
+      <p:sp>
+        <p:nvSpPr>
+          <p:cNvPr id="20" name="TextBox 19">
+            <a:extLst>
+              <a:ext uri="{FF2B5EF4-FFF2-40B4-BE49-F238E27FC236}">
+                <a16:creationId xmlns:a16="http://schemas.microsoft.com/office/drawing/2014/main" id="{48EE7C3A-890D-48B8-A5B5-D3D16FCC045E}"/>
               </a:ext>
             </a:extLst>
           </p:cNvPr>
@@ -7813,8 +7837,8 @@
         </p:nvSpPr>
         <p:spPr>
           <a:xfrm>
-            <a:off x="6812280" y="6031152"/>
-            <a:ext cx="1290320" cy="923330"/>
+            <a:off x="2380571" y="2202737"/>
+            <a:ext cx="998375" cy="369332"/>
           </a:xfrm>
           <a:prstGeom prst="rect">
             <a:avLst/>
@@ -7829,7 +7853,431 @@
           <a:p>
             <a:r>
               <a:rPr lang="en-US" dirty="0"/>
-              <a:t>Behaves like short if open</a:t>
+              <a:t>4.5 A</a:t>
+            </a:r>
+          </a:p>
+        </p:txBody>
+      </p:sp>
+      <p:cxnSp>
+        <p:nvCxnSpPr>
+          <p:cNvPr id="21" name="Straight Arrow Connector 20">
+            <a:extLst>
+              <a:ext uri="{FF2B5EF4-FFF2-40B4-BE49-F238E27FC236}">
+                <a16:creationId xmlns:a16="http://schemas.microsoft.com/office/drawing/2014/main" id="{D3A6412E-7918-4B1D-A7D5-113D53A4CE9B}"/>
+              </a:ext>
+            </a:extLst>
+          </p:cNvPr>
+          <p:cNvCxnSpPr>
+            <a:cxnSpLocks/>
+          </p:cNvCxnSpPr>
+          <p:nvPr/>
+        </p:nvCxnSpPr>
+        <p:spPr>
+          <a:xfrm>
+            <a:off x="3094653" y="2478087"/>
+            <a:ext cx="2025987" cy="864247"/>
+          </a:xfrm>
+          <a:prstGeom prst="straightConnector1">
+            <a:avLst/>
+          </a:prstGeom>
+          <a:ln w="38100">
+            <a:solidFill>
+              <a:srgbClr val="7030A0"/>
+            </a:solidFill>
+            <a:tailEnd type="triangle"/>
+          </a:ln>
+        </p:spPr>
+        <p:style>
+          <a:lnRef idx="1">
+            <a:schemeClr val="accent1"/>
+          </a:lnRef>
+          <a:fillRef idx="0">
+            <a:schemeClr val="accent1"/>
+          </a:fillRef>
+          <a:effectRef idx="0">
+            <a:schemeClr val="accent1"/>
+          </a:effectRef>
+          <a:fontRef idx="minor">
+            <a:schemeClr val="tx1"/>
+          </a:fontRef>
+        </p:style>
+      </p:cxnSp>
+      <p:cxnSp>
+        <p:nvCxnSpPr>
+          <p:cNvPr id="24" name="Straight Arrow Connector 23">
+            <a:extLst>
+              <a:ext uri="{FF2B5EF4-FFF2-40B4-BE49-F238E27FC236}">
+                <a16:creationId xmlns:a16="http://schemas.microsoft.com/office/drawing/2014/main" id="{1B6FD373-D4CD-4234-986F-E5DE2B3B99D5}"/>
+              </a:ext>
+            </a:extLst>
+          </p:cNvPr>
+          <p:cNvCxnSpPr>
+            <a:cxnSpLocks/>
+          </p:cNvCxnSpPr>
+          <p:nvPr/>
+        </p:nvCxnSpPr>
+        <p:spPr>
+          <a:xfrm flipV="1">
+            <a:off x="2208245" y="3546806"/>
+            <a:ext cx="3763346" cy="424344"/>
+          </a:xfrm>
+          <a:prstGeom prst="straightConnector1">
+            <a:avLst/>
+          </a:prstGeom>
+          <a:ln w="38100">
+            <a:solidFill>
+              <a:srgbClr val="7030A0"/>
+            </a:solidFill>
+            <a:prstDash val="lgDash"/>
+            <a:tailEnd type="triangle"/>
+          </a:ln>
+        </p:spPr>
+        <p:style>
+          <a:lnRef idx="1">
+            <a:schemeClr val="accent1"/>
+          </a:lnRef>
+          <a:fillRef idx="0">
+            <a:schemeClr val="accent1"/>
+          </a:fillRef>
+          <a:effectRef idx="0">
+            <a:schemeClr val="accent1"/>
+          </a:effectRef>
+          <a:fontRef idx="minor">
+            <a:schemeClr val="tx1"/>
+          </a:fontRef>
+        </p:style>
+      </p:cxnSp>
+      <p:sp>
+        <p:nvSpPr>
+          <p:cNvPr id="27" name="TextBox 26">
+            <a:extLst>
+              <a:ext uri="{FF2B5EF4-FFF2-40B4-BE49-F238E27FC236}">
+                <a16:creationId xmlns:a16="http://schemas.microsoft.com/office/drawing/2014/main" id="{869CA1D0-555C-4D4A-9657-3AC7D2034C7E}"/>
+              </a:ext>
+            </a:extLst>
+          </p:cNvPr>
+          <p:cNvSpPr txBox="1"/>
+          <p:nvPr/>
+        </p:nvSpPr>
+        <p:spPr>
+          <a:xfrm>
+            <a:off x="2408272" y="4247372"/>
+            <a:ext cx="998375" cy="369332"/>
+          </a:xfrm>
+          <a:prstGeom prst="rect">
+            <a:avLst/>
+          </a:prstGeom>
+          <a:noFill/>
+        </p:spPr>
+        <p:txBody>
+          <a:bodyPr wrap="square" rtlCol="0">
+            <a:spAutoFit/>
+          </a:bodyPr>
+          <a:lstStyle/>
+          <a:p>
+            <a:r>
+              <a:rPr lang="en-US" dirty="0"/>
+              <a:t>8 A</a:t>
+            </a:r>
+          </a:p>
+        </p:txBody>
+      </p:sp>
+      <p:cxnSp>
+        <p:nvCxnSpPr>
+          <p:cNvPr id="28" name="Straight Arrow Connector 27">
+            <a:extLst>
+              <a:ext uri="{FF2B5EF4-FFF2-40B4-BE49-F238E27FC236}">
+                <a16:creationId xmlns:a16="http://schemas.microsoft.com/office/drawing/2014/main" id="{04CEB38C-4E61-4F6A-8D59-3E10518165A4}"/>
+              </a:ext>
+            </a:extLst>
+          </p:cNvPr>
+          <p:cNvCxnSpPr>
+            <a:cxnSpLocks/>
+          </p:cNvCxnSpPr>
+          <p:nvPr/>
+        </p:nvCxnSpPr>
+        <p:spPr>
+          <a:xfrm flipV="1">
+            <a:off x="2907459" y="3629608"/>
+            <a:ext cx="6367170" cy="1293063"/>
+          </a:xfrm>
+          <a:prstGeom prst="straightConnector1">
+            <a:avLst/>
+          </a:prstGeom>
+          <a:ln w="38100">
+            <a:solidFill>
+              <a:srgbClr val="7030A0"/>
+            </a:solidFill>
+            <a:prstDash val="lgDash"/>
+            <a:tailEnd type="triangle"/>
+          </a:ln>
+        </p:spPr>
+        <p:style>
+          <a:lnRef idx="1">
+            <a:schemeClr val="accent1"/>
+          </a:lnRef>
+          <a:fillRef idx="0">
+            <a:schemeClr val="accent1"/>
+          </a:fillRef>
+          <a:effectRef idx="0">
+            <a:schemeClr val="accent1"/>
+          </a:effectRef>
+          <a:fontRef idx="minor">
+            <a:schemeClr val="tx1"/>
+          </a:fontRef>
+        </p:style>
+      </p:cxnSp>
+      <p:sp>
+        <p:nvSpPr>
+          <p:cNvPr id="31" name="TextBox 30">
+            <a:extLst>
+              <a:ext uri="{FF2B5EF4-FFF2-40B4-BE49-F238E27FC236}">
+                <a16:creationId xmlns:a16="http://schemas.microsoft.com/office/drawing/2014/main" id="{8A1A4489-A18B-4DC6-8ED7-02B7DA244516}"/>
+              </a:ext>
+            </a:extLst>
+          </p:cNvPr>
+          <p:cNvSpPr txBox="1"/>
+          <p:nvPr/>
+        </p:nvSpPr>
+        <p:spPr>
+          <a:xfrm>
+            <a:off x="2308920" y="4794379"/>
+            <a:ext cx="998375" cy="369332"/>
+          </a:xfrm>
+          <a:prstGeom prst="rect">
+            <a:avLst/>
+          </a:prstGeom>
+          <a:noFill/>
+        </p:spPr>
+        <p:txBody>
+          <a:bodyPr wrap="square" rtlCol="0">
+            <a:spAutoFit/>
+          </a:bodyPr>
+          <a:lstStyle/>
+          <a:p>
+            <a:r>
+              <a:rPr lang="en-US" dirty="0"/>
+              <a:t>1 A</a:t>
+            </a:r>
+          </a:p>
+        </p:txBody>
+      </p:sp>
+      <p:sp>
+        <p:nvSpPr>
+          <p:cNvPr id="32" name="TextBox 31">
+            <a:extLst>
+              <a:ext uri="{FF2B5EF4-FFF2-40B4-BE49-F238E27FC236}">
+                <a16:creationId xmlns:a16="http://schemas.microsoft.com/office/drawing/2014/main" id="{A0D98680-2EF5-4367-95AD-6F109CB5DA0C}"/>
+              </a:ext>
+            </a:extLst>
+          </p:cNvPr>
+          <p:cNvSpPr txBox="1"/>
+          <p:nvPr/>
+        </p:nvSpPr>
+        <p:spPr>
+          <a:xfrm>
+            <a:off x="4745713" y="6376700"/>
+            <a:ext cx="1819471" cy="369332"/>
+          </a:xfrm>
+          <a:prstGeom prst="rect">
+            <a:avLst/>
+          </a:prstGeom>
+          <a:noFill/>
+        </p:spPr>
+        <p:txBody>
+          <a:bodyPr wrap="square" rtlCol="0">
+            <a:spAutoFit/>
+          </a:bodyPr>
+          <a:lstStyle/>
+          <a:p>
+            <a:r>
+              <a:rPr lang="en-US" dirty="0"/>
+              <a:t>Half-Resistance</a:t>
+            </a:r>
+          </a:p>
+        </p:txBody>
+      </p:sp>
+      <p:sp>
+        <p:nvSpPr>
+          <p:cNvPr id="33" name="TextBox 32">
+            <a:extLst>
+              <a:ext uri="{FF2B5EF4-FFF2-40B4-BE49-F238E27FC236}">
+                <a16:creationId xmlns:a16="http://schemas.microsoft.com/office/drawing/2014/main" id="{8F3BDA1A-97E4-4919-AA08-3BFBD4EF808B}"/>
+              </a:ext>
+            </a:extLst>
+          </p:cNvPr>
+          <p:cNvSpPr txBox="1"/>
+          <p:nvPr/>
+        </p:nvSpPr>
+        <p:spPr>
+          <a:xfrm>
+            <a:off x="6693616" y="6389922"/>
+            <a:ext cx="1819471" cy="369332"/>
+          </a:xfrm>
+          <a:prstGeom prst="rect">
+            <a:avLst/>
+          </a:prstGeom>
+          <a:noFill/>
+        </p:spPr>
+        <p:txBody>
+          <a:bodyPr wrap="square" rtlCol="0">
+            <a:spAutoFit/>
+          </a:bodyPr>
+          <a:lstStyle/>
+          <a:p>
+            <a:r>
+              <a:rPr lang="en-US" dirty="0"/>
+              <a:t>Short</a:t>
+            </a:r>
+          </a:p>
+        </p:txBody>
+      </p:sp>
+      <p:sp>
+        <p:nvSpPr>
+          <p:cNvPr id="34" name="TextBox 33">
+            <a:extLst>
+              <a:ext uri="{FF2B5EF4-FFF2-40B4-BE49-F238E27FC236}">
+                <a16:creationId xmlns:a16="http://schemas.microsoft.com/office/drawing/2014/main" id="{BC89DDD1-7C50-4E2B-BB17-550887D68640}"/>
+              </a:ext>
+            </a:extLst>
+          </p:cNvPr>
+          <p:cNvSpPr txBox="1"/>
+          <p:nvPr/>
+        </p:nvSpPr>
+        <p:spPr>
+          <a:xfrm>
+            <a:off x="8256223" y="6376700"/>
+            <a:ext cx="1819471" cy="369332"/>
+          </a:xfrm>
+          <a:prstGeom prst="rect">
+            <a:avLst/>
+          </a:prstGeom>
+          <a:noFill/>
+        </p:spPr>
+        <p:txBody>
+          <a:bodyPr wrap="square" rtlCol="0">
+            <a:spAutoFit/>
+          </a:bodyPr>
+          <a:lstStyle/>
+          <a:p>
+            <a:r>
+              <a:rPr lang="en-US" dirty="0"/>
+              <a:t>Open</a:t>
+            </a:r>
+          </a:p>
+        </p:txBody>
+      </p:sp>
+      <p:cxnSp>
+        <p:nvCxnSpPr>
+          <p:cNvPr id="37" name="Straight Arrow Connector 36">
+            <a:extLst>
+              <a:ext uri="{FF2B5EF4-FFF2-40B4-BE49-F238E27FC236}">
+                <a16:creationId xmlns:a16="http://schemas.microsoft.com/office/drawing/2014/main" id="{494E9548-A830-4EEF-AE73-7E560FD42DEF}"/>
+              </a:ext>
+            </a:extLst>
+          </p:cNvPr>
+          <p:cNvCxnSpPr>
+            <a:cxnSpLocks/>
+          </p:cNvCxnSpPr>
+          <p:nvPr/>
+        </p:nvCxnSpPr>
+        <p:spPr>
+          <a:xfrm flipV="1">
+            <a:off x="2951584" y="3483428"/>
+            <a:ext cx="4863446" cy="933062"/>
+          </a:xfrm>
+          <a:prstGeom prst="straightConnector1">
+            <a:avLst/>
+          </a:prstGeom>
+          <a:ln w="38100">
+            <a:solidFill>
+              <a:srgbClr val="7030A0"/>
+            </a:solidFill>
+            <a:prstDash val="lgDash"/>
+            <a:tailEnd type="triangle"/>
+          </a:ln>
+        </p:spPr>
+        <p:style>
+          <a:lnRef idx="1">
+            <a:schemeClr val="accent1"/>
+          </a:lnRef>
+          <a:fillRef idx="0">
+            <a:schemeClr val="accent1"/>
+          </a:fillRef>
+          <a:effectRef idx="0">
+            <a:schemeClr val="accent1"/>
+          </a:effectRef>
+          <a:fontRef idx="minor">
+            <a:schemeClr val="tx1"/>
+          </a:fontRef>
+        </p:style>
+      </p:cxnSp>
+      <p:sp>
+        <p:nvSpPr>
+          <p:cNvPr id="40" name="TextBox 39">
+            <a:extLst>
+              <a:ext uri="{FF2B5EF4-FFF2-40B4-BE49-F238E27FC236}">
+                <a16:creationId xmlns:a16="http://schemas.microsoft.com/office/drawing/2014/main" id="{5A276FC0-1E2F-4513-BBCD-B7E55EF25A30}"/>
+              </a:ext>
+            </a:extLst>
+          </p:cNvPr>
+          <p:cNvSpPr txBox="1"/>
+          <p:nvPr/>
+        </p:nvSpPr>
+        <p:spPr>
+          <a:xfrm>
+            <a:off x="1709057" y="3765293"/>
+            <a:ext cx="998375" cy="369332"/>
+          </a:xfrm>
+          <a:prstGeom prst="rect">
+            <a:avLst/>
+          </a:prstGeom>
+          <a:noFill/>
+        </p:spPr>
+        <p:txBody>
+          <a:bodyPr wrap="square" rtlCol="0">
+            <a:spAutoFit/>
+          </a:bodyPr>
+          <a:lstStyle/>
+          <a:p>
+            <a:r>
+              <a:rPr lang="en-US" dirty="0"/>
+              <a:t>5 A</a:t>
+            </a:r>
+          </a:p>
+        </p:txBody>
+      </p:sp>
+      <p:sp>
+        <p:nvSpPr>
+          <p:cNvPr id="42" name="TextBox 41">
+            <a:extLst>
+              <a:ext uri="{FF2B5EF4-FFF2-40B4-BE49-F238E27FC236}">
+                <a16:creationId xmlns:a16="http://schemas.microsoft.com/office/drawing/2014/main" id="{C5FA646E-521C-4297-8944-54BD88C5BD76}"/>
+              </a:ext>
+            </a:extLst>
+          </p:cNvPr>
+          <p:cNvSpPr txBox="1"/>
+          <p:nvPr/>
+        </p:nvSpPr>
+        <p:spPr>
+          <a:xfrm>
+            <a:off x="304798" y="881313"/>
+            <a:ext cx="2789855" cy="646331"/>
+          </a:xfrm>
+          <a:prstGeom prst="rect">
+            <a:avLst/>
+          </a:prstGeom>
+          <a:noFill/>
+        </p:spPr>
+        <p:txBody>
+          <a:bodyPr wrap="square" rtlCol="0">
+            <a:spAutoFit/>
+          </a:bodyPr>
+          <a:lstStyle/>
+          <a:p>
+            <a:r>
+              <a:rPr lang="en-US" dirty="0"/>
+              <a:t>Motor effected from change on WPT  load.</a:t>
             </a:r>
           </a:p>
         </p:txBody>
@@ -7837,7 +8285,7 @@
     </p:spTree>
     <p:extLst>
       <p:ext uri="{BB962C8B-B14F-4D97-AF65-F5344CB8AC3E}">
-        <p14:creationId xmlns:p14="http://schemas.microsoft.com/office/powerpoint/2010/main" val="98929168"/>
+        <p14:creationId xmlns:p14="http://schemas.microsoft.com/office/powerpoint/2010/main" val="1893470800"/>
       </p:ext>
     </p:extLst>
   </p:cSld>
@@ -7864,12 +8312,54 @@
           <a:chExt cx="0" cy="0"/>
         </a:xfrm>
       </p:grpSpPr>
+      <p:sp>
+        <p:nvSpPr>
+          <p:cNvPr id="4" name="TextBox 3">
+            <a:extLst>
+              <a:ext uri="{FF2B5EF4-FFF2-40B4-BE49-F238E27FC236}">
+                <a16:creationId xmlns:a16="http://schemas.microsoft.com/office/drawing/2014/main" id="{A6F86759-0562-470F-8D29-6FB65959BBB5}"/>
+              </a:ext>
+            </a:extLst>
+          </p:cNvPr>
+          <p:cNvSpPr txBox="1"/>
+          <p:nvPr/>
+        </p:nvSpPr>
+        <p:spPr>
+          <a:xfrm>
+            <a:off x="3921969" y="139961"/>
+            <a:ext cx="4945223" cy="707886"/>
+          </a:xfrm>
+          <a:prstGeom prst="rect">
+            <a:avLst/>
+          </a:prstGeom>
+          <a:noFill/>
+        </p:spPr>
+        <p:txBody>
+          <a:bodyPr wrap="square" rtlCol="0">
+            <a:spAutoFit/>
+          </a:bodyPr>
+          <a:lstStyle/>
+          <a:p>
+            <a:r>
+              <a:rPr lang="en-US" sz="4000" dirty="0">
+                <a:latin typeface="Times New Roman" panose="02020603050405020304" pitchFamily="18" charset="0"/>
+                <a:cs typeface="Times New Roman" panose="02020603050405020304" pitchFamily="18" charset="0"/>
+              </a:rPr>
+              <a:t>Impedance Modelling</a:t>
+            </a:r>
+            <a:r>
+              <a:rPr lang="en-US" dirty="0"/>
+              <a:t> </a:t>
+            </a:r>
+          </a:p>
+        </p:txBody>
+      </p:sp>
       <p:pic>
         <p:nvPicPr>
-          <p:cNvPr id="4" name="Picture 3">
-            <a:extLst>
-              <a:ext uri="{FF2B5EF4-FFF2-40B4-BE49-F238E27FC236}">
-                <a16:creationId xmlns:a16="http://schemas.microsoft.com/office/drawing/2014/main" id="{DC27C569-B002-4331-8529-233790734412}"/>
+          <p:cNvPr id="5" name="Picture 4">
+            <a:extLst>
+              <a:ext uri="{FF2B5EF4-FFF2-40B4-BE49-F238E27FC236}">
+                <a16:creationId xmlns:a16="http://schemas.microsoft.com/office/drawing/2014/main" id="{76079B00-C787-4413-A2DE-16BE4E059637}"/>
               </a:ext>
             </a:extLst>
           </p:cNvPr>
@@ -7886,210 +8376,20 @@
         </p:blipFill>
         <p:spPr>
           <a:xfrm>
-            <a:off x="164138" y="620488"/>
-            <a:ext cx="5931862" cy="4020716"/>
+            <a:off x="1402080" y="1247769"/>
+            <a:ext cx="9641840" cy="4700397"/>
           </a:xfrm>
           <a:prstGeom prst="rect">
             <a:avLst/>
           </a:prstGeom>
         </p:spPr>
       </p:pic>
-      <p:sp>
-        <p:nvSpPr>
-          <p:cNvPr id="5" name="TextBox 4">
-            <a:extLst>
-              <a:ext uri="{FF2B5EF4-FFF2-40B4-BE49-F238E27FC236}">
-                <a16:creationId xmlns:a16="http://schemas.microsoft.com/office/drawing/2014/main" id="{95F32377-45EB-4FEA-8B96-38070934B223}"/>
-              </a:ext>
-            </a:extLst>
-          </p:cNvPr>
-          <p:cNvSpPr txBox="1"/>
-          <p:nvPr/>
-        </p:nvSpPr>
-        <p:spPr>
-          <a:xfrm>
-            <a:off x="8071682" y="4550813"/>
-            <a:ext cx="3956180" cy="369332"/>
-          </a:xfrm>
-          <a:prstGeom prst="rect">
-            <a:avLst/>
-          </a:prstGeom>
-          <a:noFill/>
-        </p:spPr>
-        <p:txBody>
-          <a:bodyPr wrap="square" rtlCol="0">
-            <a:spAutoFit/>
-          </a:bodyPr>
-          <a:lstStyle/>
-          <a:p>
-            <a:r>
-              <a:rPr lang="en-US" dirty="0"/>
-              <a:t>Constant Frequency</a:t>
-            </a:r>
-          </a:p>
-        </p:txBody>
-      </p:sp>
-      <p:pic>
-        <p:nvPicPr>
-          <p:cNvPr id="6" name="Picture 5">
-            <a:extLst>
-              <a:ext uri="{FF2B5EF4-FFF2-40B4-BE49-F238E27FC236}">
-                <a16:creationId xmlns:a16="http://schemas.microsoft.com/office/drawing/2014/main" id="{967ABE4B-875F-4985-AB45-46CCAE25E98A}"/>
-              </a:ext>
-            </a:extLst>
-          </p:cNvPr>
-          <p:cNvPicPr>
-            <a:picLocks noChangeAspect="1"/>
-          </p:cNvPicPr>
-          <p:nvPr/>
-        </p:nvPicPr>
-        <p:blipFill>
-          <a:blip r:embed="rId3"/>
-          <a:stretch>
-            <a:fillRect/>
-          </a:stretch>
-        </p:blipFill>
-        <p:spPr>
-          <a:xfrm>
-            <a:off x="6451266" y="604739"/>
-            <a:ext cx="5334000" cy="4000500"/>
-          </a:xfrm>
-          <a:prstGeom prst="rect">
-            <a:avLst/>
-          </a:prstGeom>
-        </p:spPr>
-      </p:pic>
-      <p:sp>
-        <p:nvSpPr>
-          <p:cNvPr id="7" name="TextBox 6">
-            <a:extLst>
-              <a:ext uri="{FF2B5EF4-FFF2-40B4-BE49-F238E27FC236}">
-                <a16:creationId xmlns:a16="http://schemas.microsoft.com/office/drawing/2014/main" id="{8A0CC347-7E74-4E39-AB75-E55407161684}"/>
-              </a:ext>
-            </a:extLst>
-          </p:cNvPr>
-          <p:cNvSpPr txBox="1"/>
-          <p:nvPr/>
-        </p:nvSpPr>
-        <p:spPr>
-          <a:xfrm>
-            <a:off x="2233127" y="4587847"/>
-            <a:ext cx="3956180" cy="369332"/>
-          </a:xfrm>
-          <a:prstGeom prst="rect">
-            <a:avLst/>
-          </a:prstGeom>
-          <a:noFill/>
-        </p:spPr>
-        <p:txBody>
-          <a:bodyPr wrap="square" rtlCol="0">
-            <a:spAutoFit/>
-          </a:bodyPr>
-          <a:lstStyle/>
-          <a:p>
-            <a:r>
-              <a:rPr lang="en-US" dirty="0"/>
-              <a:t>Constant Duty Cycle</a:t>
-            </a:r>
-          </a:p>
-        </p:txBody>
-      </p:sp>
-      <p:sp>
-        <p:nvSpPr>
-          <p:cNvPr id="8" name="TextBox 7">
-            <a:extLst>
-              <a:ext uri="{FF2B5EF4-FFF2-40B4-BE49-F238E27FC236}">
-                <a16:creationId xmlns:a16="http://schemas.microsoft.com/office/drawing/2014/main" id="{9A88EBBC-317F-472A-BE4F-FF362FB2C738}"/>
-              </a:ext>
-            </a:extLst>
-          </p:cNvPr>
-          <p:cNvSpPr txBox="1"/>
-          <p:nvPr/>
-        </p:nvSpPr>
-        <p:spPr>
-          <a:xfrm>
-            <a:off x="681135" y="4991878"/>
-            <a:ext cx="5122506" cy="646331"/>
-          </a:xfrm>
-          <a:prstGeom prst="rect">
-            <a:avLst/>
-          </a:prstGeom>
-          <a:noFill/>
-        </p:spPr>
-        <p:txBody>
-          <a:bodyPr wrap="square" rtlCol="0">
-            <a:spAutoFit/>
-          </a:bodyPr>
-          <a:lstStyle/>
-          <a:p>
-            <a:r>
-              <a:rPr lang="en-US" dirty="0"/>
-              <a:t>Minimum frequency 80 </a:t>
-            </a:r>
-            <a:r>
-              <a:rPr lang="en-US" dirty="0" err="1"/>
-              <a:t>khZ</a:t>
-            </a:r>
-            <a:r>
-              <a:rPr lang="en-US" dirty="0"/>
-              <a:t> : Gain 0.52</a:t>
-            </a:r>
-          </a:p>
-          <a:p>
-            <a:r>
-              <a:rPr lang="en-US" dirty="0"/>
-              <a:t>Maximum frequency 110kHz: Gain 0.16</a:t>
-            </a:r>
-          </a:p>
-        </p:txBody>
-      </p:sp>
-      <p:sp>
-        <p:nvSpPr>
-          <p:cNvPr id="9" name="TextBox 8">
-            <a:extLst>
-              <a:ext uri="{FF2B5EF4-FFF2-40B4-BE49-F238E27FC236}">
-                <a16:creationId xmlns:a16="http://schemas.microsoft.com/office/drawing/2014/main" id="{43C3C131-D2D7-424A-B4B3-8AABA586A64E}"/>
-              </a:ext>
-            </a:extLst>
-          </p:cNvPr>
-          <p:cNvSpPr txBox="1"/>
-          <p:nvPr/>
-        </p:nvSpPr>
-        <p:spPr>
-          <a:xfrm>
-            <a:off x="6905356" y="4991877"/>
-            <a:ext cx="5122506" cy="646331"/>
-          </a:xfrm>
-          <a:prstGeom prst="rect">
-            <a:avLst/>
-          </a:prstGeom>
-          <a:noFill/>
-        </p:spPr>
-        <p:txBody>
-          <a:bodyPr wrap="square" rtlCol="0">
-            <a:spAutoFit/>
-          </a:bodyPr>
-          <a:lstStyle/>
-          <a:p>
-            <a:r>
-              <a:rPr lang="en-US" dirty="0"/>
-              <a:t>Minimum duty  0.5: Gain 1.27</a:t>
-            </a:r>
-          </a:p>
-          <a:p>
-            <a:r>
-              <a:rPr lang="en-US" dirty="0"/>
-              <a:t>Maximum duty 0.9: Gain 0.3935</a:t>
-            </a:r>
-          </a:p>
-        </p:txBody>
-      </p:sp>
       <p:cxnSp>
         <p:nvCxnSpPr>
-          <p:cNvPr id="11" name="Straight Connector 10">
-            <a:extLst>
-              <a:ext uri="{FF2B5EF4-FFF2-40B4-BE49-F238E27FC236}">
-                <a16:creationId xmlns:a16="http://schemas.microsoft.com/office/drawing/2014/main" id="{19B02DE6-B856-4017-992C-7194955294CB}"/>
+          <p:cNvPr id="7" name="Straight Arrow Connector 6">
+            <a:extLst>
+              <a:ext uri="{FF2B5EF4-FFF2-40B4-BE49-F238E27FC236}">
+                <a16:creationId xmlns:a16="http://schemas.microsoft.com/office/drawing/2014/main" id="{E97368EB-38D6-4262-9B2A-E4D5EC0B87FD}"/>
               </a:ext>
             </a:extLst>
           </p:cNvPr>
@@ -8099,13 +8399,19 @@
           <p:nvPr/>
         </p:nvCxnSpPr>
         <p:spPr>
-          <a:xfrm>
-            <a:off x="4655976" y="5150498"/>
-            <a:ext cx="2249380" cy="317241"/>
-          </a:xfrm>
-          <a:prstGeom prst="line">
-            <a:avLst/>
-          </a:prstGeom>
+          <a:xfrm flipH="1" flipV="1">
+            <a:off x="8778240" y="4754880"/>
+            <a:ext cx="914400" cy="1310640"/>
+          </a:xfrm>
+          <a:prstGeom prst="straightConnector1">
+            <a:avLst/>
+          </a:prstGeom>
+          <a:ln w="28575">
+            <a:solidFill>
+              <a:srgbClr val="7030A0"/>
+            </a:solidFill>
+            <a:tailEnd type="triangle"/>
+          </a:ln>
         </p:spPr>
         <p:style>
           <a:lnRef idx="1">
@@ -8122,12 +8428,47 @@
           </a:fontRef>
         </p:style>
       </p:cxnSp>
+      <p:sp>
+        <p:nvSpPr>
+          <p:cNvPr id="10" name="TextBox 9">
+            <a:extLst>
+              <a:ext uri="{FF2B5EF4-FFF2-40B4-BE49-F238E27FC236}">
+                <a16:creationId xmlns:a16="http://schemas.microsoft.com/office/drawing/2014/main" id="{267F007D-158C-44BB-8C3C-389452F673E2}"/>
+              </a:ext>
+            </a:extLst>
+          </p:cNvPr>
+          <p:cNvSpPr txBox="1"/>
+          <p:nvPr/>
+        </p:nvSpPr>
+        <p:spPr>
+          <a:xfrm>
+            <a:off x="9753600" y="5748378"/>
+            <a:ext cx="1290320" cy="923330"/>
+          </a:xfrm>
+          <a:prstGeom prst="rect">
+            <a:avLst/>
+          </a:prstGeom>
+          <a:noFill/>
+        </p:spPr>
+        <p:txBody>
+          <a:bodyPr wrap="square" rtlCol="0">
+            <a:spAutoFit/>
+          </a:bodyPr>
+          <a:lstStyle/>
+          <a:p>
+            <a:r>
+              <a:rPr lang="en-US" dirty="0"/>
+              <a:t>Behaves like short if short</a:t>
+            </a:r>
+          </a:p>
+        </p:txBody>
+      </p:sp>
       <p:cxnSp>
         <p:nvCxnSpPr>
-          <p:cNvPr id="13" name="Straight Connector 12">
-            <a:extLst>
-              <a:ext uri="{FF2B5EF4-FFF2-40B4-BE49-F238E27FC236}">
-                <a16:creationId xmlns:a16="http://schemas.microsoft.com/office/drawing/2014/main" id="{49E43A3C-39CE-4813-984E-DA88A7445A71}"/>
+          <p:cNvPr id="11" name="Straight Arrow Connector 10">
+            <a:extLst>
+              <a:ext uri="{FF2B5EF4-FFF2-40B4-BE49-F238E27FC236}">
+                <a16:creationId xmlns:a16="http://schemas.microsoft.com/office/drawing/2014/main" id="{E820953E-5CAE-4588-BDDC-3C8EAB493CE1}"/>
               </a:ext>
             </a:extLst>
           </p:cNvPr>
@@ -8137,13 +8478,19 @@
           <p:nvPr/>
         </p:nvCxnSpPr>
         <p:spPr>
-          <a:xfrm flipH="1">
-            <a:off x="4655976" y="5150498"/>
-            <a:ext cx="2037886" cy="317241"/>
-          </a:xfrm>
-          <a:prstGeom prst="line">
-            <a:avLst/>
-          </a:prstGeom>
+          <a:xfrm flipV="1">
+            <a:off x="7813040" y="5159575"/>
+            <a:ext cx="822960" cy="1150362"/>
+          </a:xfrm>
+          <a:prstGeom prst="straightConnector1">
+            <a:avLst/>
+          </a:prstGeom>
+          <a:ln w="28575">
+            <a:solidFill>
+              <a:srgbClr val="7030A0"/>
+            </a:solidFill>
+            <a:tailEnd type="triangle"/>
+          </a:ln>
         </p:spPr>
         <p:style>
           <a:lnRef idx="1">
@@ -8162,10 +8509,10 @@
       </p:cxnSp>
       <p:sp>
         <p:nvSpPr>
-          <p:cNvPr id="20" name="TextBox 19">
-            <a:extLst>
-              <a:ext uri="{FF2B5EF4-FFF2-40B4-BE49-F238E27FC236}">
-                <a16:creationId xmlns:a16="http://schemas.microsoft.com/office/drawing/2014/main" id="{F8B2130B-5920-4F4B-950B-73223B70392A}"/>
+          <p:cNvPr id="14" name="TextBox 13">
+            <a:extLst>
+              <a:ext uri="{FF2B5EF4-FFF2-40B4-BE49-F238E27FC236}">
+                <a16:creationId xmlns:a16="http://schemas.microsoft.com/office/drawing/2014/main" id="{19E00A61-429F-48DC-9250-01F886F1166E}"/>
               </a:ext>
             </a:extLst>
           </p:cNvPr>
@@ -8174,8 +8521,8 @@
         </p:nvSpPr>
         <p:spPr>
           <a:xfrm>
-            <a:off x="4565780" y="5854377"/>
-            <a:ext cx="2964024" cy="369332"/>
+            <a:off x="6812280" y="6031152"/>
+            <a:ext cx="1290320" cy="923330"/>
           </a:xfrm>
           <a:prstGeom prst="rect">
             <a:avLst/>
@@ -8190,89 +8537,7 @@
           <a:p>
             <a:r>
               <a:rPr lang="en-US" dirty="0"/>
-              <a:t>DC gain </a:t>
-            </a:r>
-            <a:r>
-              <a:rPr lang="en-US" dirty="0">
-                <a:sym typeface="Wingdings" panose="05000000000000000000" pitchFamily="2" charset="2"/>
-              </a:rPr>
-              <a:t> 0.6 (maximum) </a:t>
-            </a:r>
-            <a:endParaRPr lang="en-US" dirty="0"/>
-          </a:p>
-        </p:txBody>
-      </p:sp>
-      <p:sp>
-        <p:nvSpPr>
-          <p:cNvPr id="21" name="TextBox 20">
-            <a:extLst>
-              <a:ext uri="{FF2B5EF4-FFF2-40B4-BE49-F238E27FC236}">
-                <a16:creationId xmlns:a16="http://schemas.microsoft.com/office/drawing/2014/main" id="{9B8583C4-A19B-4F46-91E5-52CC3105B1F3}"/>
-              </a:ext>
-            </a:extLst>
-          </p:cNvPr>
-          <p:cNvSpPr txBox="1"/>
-          <p:nvPr/>
-        </p:nvSpPr>
-        <p:spPr>
-          <a:xfrm>
-            <a:off x="4565780" y="6170444"/>
-            <a:ext cx="2833397" cy="369332"/>
-          </a:xfrm>
-          <a:prstGeom prst="rect">
-            <a:avLst/>
-          </a:prstGeom>
-          <a:noFill/>
-        </p:spPr>
-        <p:txBody>
-          <a:bodyPr wrap="square" rtlCol="0">
-            <a:spAutoFit/>
-          </a:bodyPr>
-          <a:lstStyle/>
-          <a:p>
-            <a:r>
-              <a:rPr lang="en-US" dirty="0"/>
-              <a:t>AC gain </a:t>
-            </a:r>
-            <a:r>
-              <a:rPr lang="en-US" dirty="0">
-                <a:sym typeface="Wingdings" panose="05000000000000000000" pitchFamily="2" charset="2"/>
-              </a:rPr>
-              <a:t> 0.20  (constant)</a:t>
-            </a:r>
-            <a:endParaRPr lang="en-US" dirty="0"/>
-          </a:p>
-        </p:txBody>
-      </p:sp>
-      <p:sp>
-        <p:nvSpPr>
-          <p:cNvPr id="22" name="Title 1">
-            <a:extLst>
-              <a:ext uri="{FF2B5EF4-FFF2-40B4-BE49-F238E27FC236}">
-                <a16:creationId xmlns:a16="http://schemas.microsoft.com/office/drawing/2014/main" id="{04E5064E-DEB4-4D58-88CC-B0EA6E749DB6}"/>
-              </a:ext>
-            </a:extLst>
-          </p:cNvPr>
-          <p:cNvSpPr>
-            <a:spLocks noGrp="1"/>
-          </p:cNvSpPr>
-          <p:nvPr>
-            <p:ph type="title"/>
-          </p:nvPr>
-        </p:nvSpPr>
-        <p:spPr>
-          <a:xfrm>
-            <a:off x="3380015" y="83641"/>
-            <a:ext cx="5525278" cy="757627"/>
-          </a:xfrm>
-        </p:spPr>
-        <p:txBody>
-          <a:bodyPr/>
-          <a:lstStyle/>
-          <a:p>
-            <a:r>
-              <a:rPr lang="en-US" dirty="0"/>
-              <a:t>Duty Cycle-Frequency </a:t>
+              <a:t>Behaves like short if open</a:t>
             </a:r>
           </a:p>
         </p:txBody>
@@ -8280,7 +8545,7 @@
     </p:spTree>
     <p:extLst>
       <p:ext uri="{BB962C8B-B14F-4D97-AF65-F5344CB8AC3E}">
-        <p14:creationId xmlns:p14="http://schemas.microsoft.com/office/powerpoint/2010/main" val="2262665028"/>
+        <p14:creationId xmlns:p14="http://schemas.microsoft.com/office/powerpoint/2010/main" val="98929168"/>
       </p:ext>
     </p:extLst>
   </p:cSld>

</xml_diff>